<commit_message>
Updated handouts and notes Updated gitignore
</commit_message>
<xml_diff>
--- a/presentations/5 - Data Acquisition and Analysis Basics - OCE2901.pptx
+++ b/presentations/5 - Data Acquisition and Analysis Basics - OCE2901.pptx
@@ -169,7 +169,7 @@
   <pc:docChgLst>
     <pc:chgData name="Braidan Duffy" userId="8ec18d3d-6fdf-489b-8ea9-501a0a9031aa" providerId="ADAL" clId="{95A0B696-B669-4D7B-9DE4-0619CC5496F8}"/>
     <pc:docChg chg="undo custSel addSld delSld modSld sldOrd modSection">
-      <pc:chgData name="Braidan Duffy" userId="8ec18d3d-6fdf-489b-8ea9-501a0a9031aa" providerId="ADAL" clId="{95A0B696-B669-4D7B-9DE4-0619CC5496F8}" dt="2023-01-20T03:41:21.958" v="4690" actId="47"/>
+      <pc:chgData name="Braidan Duffy" userId="8ec18d3d-6fdf-489b-8ea9-501a0a9031aa" providerId="ADAL" clId="{95A0B696-B669-4D7B-9DE4-0619CC5496F8}" dt="2023-02-27T03:44:59.397" v="4692" actId="27297"/>
       <pc:docMkLst>
         <pc:docMk/>
       </pc:docMkLst>
@@ -823,7 +823,7 @@
         </pc:cxnChg>
       </pc:sldChg>
       <pc:sldChg chg="addSp delSp modSp new mod setBg modAnim">
-        <pc:chgData name="Braidan Duffy" userId="8ec18d3d-6fdf-489b-8ea9-501a0a9031aa" providerId="ADAL" clId="{95A0B696-B669-4D7B-9DE4-0619CC5496F8}" dt="2023-01-19T22:13:39.076" v="3343" actId="207"/>
+        <pc:chgData name="Braidan Duffy" userId="8ec18d3d-6fdf-489b-8ea9-501a0a9031aa" providerId="ADAL" clId="{95A0B696-B669-4D7B-9DE4-0619CC5496F8}" dt="2023-02-27T03:44:59.397" v="4692" actId="27297"/>
         <pc:sldMkLst>
           <pc:docMk/>
           <pc:sldMk cId="844781597" sldId="294"/>
@@ -845,7 +845,7 @@
           </ac:spMkLst>
         </pc:spChg>
         <pc:graphicFrameChg chg="add mod ord modGraphic">
-          <ac:chgData name="Braidan Duffy" userId="8ec18d3d-6fdf-489b-8ea9-501a0a9031aa" providerId="ADAL" clId="{95A0B696-B669-4D7B-9DE4-0619CC5496F8}" dt="2023-01-19T22:13:39.076" v="3343" actId="207"/>
+          <ac:chgData name="Braidan Duffy" userId="8ec18d3d-6fdf-489b-8ea9-501a0a9031aa" providerId="ADAL" clId="{95A0B696-B669-4D7B-9DE4-0619CC5496F8}" dt="2023-02-27T03:44:59.397" v="4692" actId="27297"/>
           <ac:graphicFrameMkLst>
             <pc:docMk/>
             <pc:sldMk cId="844781597" sldId="294"/>
@@ -1878,6 +1878,753 @@
 </dgm:colorsDef>
 </file>
 
+<file path=ppt/diagrams/colors10.xml><?xml version="1.0" encoding="utf-8"?>
+<dgm:colorsDef xmlns:dgm="http://schemas.openxmlformats.org/drawingml/2006/diagram" xmlns:a="http://schemas.openxmlformats.org/drawingml/2006/main" uniqueId="urn:microsoft.com/office/officeart/2005/8/colors/accent1_2">
+  <dgm:title val=""/>
+  <dgm:desc val=""/>
+  <dgm:catLst>
+    <dgm:cat type="accent1" pri="11200"/>
+  </dgm:catLst>
+  <dgm:styleLbl name="node0">
+    <dgm:fillClrLst meth="repeat">
+      <a:schemeClr val="accent1"/>
+    </dgm:fillClrLst>
+    <dgm:linClrLst meth="repeat">
+      <a:schemeClr val="lt1"/>
+    </dgm:linClrLst>
+    <dgm:effectClrLst/>
+    <dgm:txLinClrLst/>
+    <dgm:txFillClrLst/>
+    <dgm:txEffectClrLst/>
+  </dgm:styleLbl>
+  <dgm:styleLbl name="alignNode1">
+    <dgm:fillClrLst meth="repeat">
+      <a:schemeClr val="accent1"/>
+    </dgm:fillClrLst>
+    <dgm:linClrLst meth="repeat">
+      <a:schemeClr val="accent1"/>
+    </dgm:linClrLst>
+    <dgm:effectClrLst/>
+    <dgm:txLinClrLst/>
+    <dgm:txFillClrLst/>
+    <dgm:txEffectClrLst/>
+  </dgm:styleLbl>
+  <dgm:styleLbl name="node1">
+    <dgm:fillClrLst meth="repeat">
+      <a:schemeClr val="accent1"/>
+    </dgm:fillClrLst>
+    <dgm:linClrLst meth="repeat">
+      <a:schemeClr val="lt1"/>
+    </dgm:linClrLst>
+    <dgm:effectClrLst/>
+    <dgm:txLinClrLst/>
+    <dgm:txFillClrLst/>
+    <dgm:txEffectClrLst/>
+  </dgm:styleLbl>
+  <dgm:styleLbl name="lnNode1">
+    <dgm:fillClrLst meth="repeat">
+      <a:schemeClr val="accent1"/>
+    </dgm:fillClrLst>
+    <dgm:linClrLst meth="repeat">
+      <a:schemeClr val="lt1"/>
+    </dgm:linClrLst>
+    <dgm:effectClrLst/>
+    <dgm:txLinClrLst/>
+    <dgm:txFillClrLst/>
+    <dgm:txEffectClrLst/>
+  </dgm:styleLbl>
+  <dgm:styleLbl name="vennNode1">
+    <dgm:fillClrLst meth="repeat">
+      <a:schemeClr val="accent1">
+        <a:alpha val="50000"/>
+      </a:schemeClr>
+    </dgm:fillClrLst>
+    <dgm:linClrLst meth="repeat">
+      <a:schemeClr val="lt1"/>
+    </dgm:linClrLst>
+    <dgm:effectClrLst/>
+    <dgm:txLinClrLst/>
+    <dgm:txFillClrLst/>
+    <dgm:txEffectClrLst/>
+  </dgm:styleLbl>
+  <dgm:styleLbl name="node2">
+    <dgm:fillClrLst meth="repeat">
+      <a:schemeClr val="accent1"/>
+    </dgm:fillClrLst>
+    <dgm:linClrLst meth="repeat">
+      <a:schemeClr val="lt1"/>
+    </dgm:linClrLst>
+    <dgm:effectClrLst/>
+    <dgm:txLinClrLst/>
+    <dgm:txFillClrLst/>
+    <dgm:txEffectClrLst/>
+  </dgm:styleLbl>
+  <dgm:styleLbl name="node3">
+    <dgm:fillClrLst meth="repeat">
+      <a:schemeClr val="accent1"/>
+    </dgm:fillClrLst>
+    <dgm:linClrLst meth="repeat">
+      <a:schemeClr val="lt1"/>
+    </dgm:linClrLst>
+    <dgm:effectClrLst/>
+    <dgm:txLinClrLst/>
+    <dgm:txFillClrLst/>
+    <dgm:txEffectClrLst/>
+  </dgm:styleLbl>
+  <dgm:styleLbl name="node4">
+    <dgm:fillClrLst meth="repeat">
+      <a:schemeClr val="accent1"/>
+    </dgm:fillClrLst>
+    <dgm:linClrLst meth="repeat">
+      <a:schemeClr val="lt1"/>
+    </dgm:linClrLst>
+    <dgm:effectClrLst/>
+    <dgm:txLinClrLst/>
+    <dgm:txFillClrLst/>
+    <dgm:txEffectClrLst/>
+  </dgm:styleLbl>
+  <dgm:styleLbl name="fgImgPlace1">
+    <dgm:fillClrLst meth="repeat">
+      <a:schemeClr val="accent1">
+        <a:tint val="50000"/>
+      </a:schemeClr>
+    </dgm:fillClrLst>
+    <dgm:linClrLst meth="repeat">
+      <a:schemeClr val="lt1"/>
+    </dgm:linClrLst>
+    <dgm:effectClrLst/>
+    <dgm:txLinClrLst/>
+    <dgm:txFillClrLst meth="repeat">
+      <a:schemeClr val="lt1"/>
+    </dgm:txFillClrLst>
+    <dgm:txEffectClrLst/>
+  </dgm:styleLbl>
+  <dgm:styleLbl name="alignImgPlace1">
+    <dgm:fillClrLst meth="repeat">
+      <a:schemeClr val="accent1">
+        <a:tint val="50000"/>
+      </a:schemeClr>
+    </dgm:fillClrLst>
+    <dgm:linClrLst meth="repeat">
+      <a:schemeClr val="lt1"/>
+    </dgm:linClrLst>
+    <dgm:effectClrLst/>
+    <dgm:txLinClrLst/>
+    <dgm:txFillClrLst meth="repeat">
+      <a:schemeClr val="lt1"/>
+    </dgm:txFillClrLst>
+    <dgm:txEffectClrLst/>
+  </dgm:styleLbl>
+  <dgm:styleLbl name="bgImgPlace1">
+    <dgm:fillClrLst meth="repeat">
+      <a:schemeClr val="accent1">
+        <a:tint val="50000"/>
+      </a:schemeClr>
+    </dgm:fillClrLst>
+    <dgm:linClrLst meth="repeat">
+      <a:schemeClr val="lt1"/>
+    </dgm:linClrLst>
+    <dgm:effectClrLst/>
+    <dgm:txLinClrLst/>
+    <dgm:txFillClrLst meth="repeat">
+      <a:schemeClr val="lt1"/>
+    </dgm:txFillClrLst>
+    <dgm:txEffectClrLst/>
+  </dgm:styleLbl>
+  <dgm:styleLbl name="sibTrans2D1">
+    <dgm:fillClrLst meth="repeat">
+      <a:schemeClr val="accent1">
+        <a:tint val="60000"/>
+      </a:schemeClr>
+    </dgm:fillClrLst>
+    <dgm:linClrLst meth="repeat">
+      <a:schemeClr val="accent1">
+        <a:tint val="60000"/>
+      </a:schemeClr>
+    </dgm:linClrLst>
+    <dgm:effectClrLst/>
+    <dgm:txLinClrLst/>
+    <dgm:txFillClrLst/>
+    <dgm:txEffectClrLst/>
+  </dgm:styleLbl>
+  <dgm:styleLbl name="fgSibTrans2D1">
+    <dgm:fillClrLst meth="repeat">
+      <a:schemeClr val="accent1">
+        <a:tint val="60000"/>
+      </a:schemeClr>
+    </dgm:fillClrLst>
+    <dgm:linClrLst meth="repeat">
+      <a:schemeClr val="accent1">
+        <a:tint val="60000"/>
+      </a:schemeClr>
+    </dgm:linClrLst>
+    <dgm:effectClrLst/>
+    <dgm:txLinClrLst/>
+    <dgm:txFillClrLst/>
+    <dgm:txEffectClrLst/>
+  </dgm:styleLbl>
+  <dgm:styleLbl name="bgSibTrans2D1">
+    <dgm:fillClrLst meth="repeat">
+      <a:schemeClr val="accent1">
+        <a:tint val="60000"/>
+      </a:schemeClr>
+    </dgm:fillClrLst>
+    <dgm:linClrLst meth="repeat">
+      <a:schemeClr val="accent1">
+        <a:tint val="60000"/>
+      </a:schemeClr>
+    </dgm:linClrLst>
+    <dgm:effectClrLst/>
+    <dgm:txLinClrLst/>
+    <dgm:txFillClrLst/>
+    <dgm:txEffectClrLst/>
+  </dgm:styleLbl>
+  <dgm:styleLbl name="sibTrans1D1">
+    <dgm:fillClrLst meth="repeat">
+      <a:schemeClr val="accent1"/>
+    </dgm:fillClrLst>
+    <dgm:linClrLst meth="repeat">
+      <a:schemeClr val="accent1"/>
+    </dgm:linClrLst>
+    <dgm:effectClrLst/>
+    <dgm:txLinClrLst/>
+    <dgm:txFillClrLst meth="repeat">
+      <a:schemeClr val="tx1"/>
+    </dgm:txFillClrLst>
+    <dgm:txEffectClrLst/>
+  </dgm:styleLbl>
+  <dgm:styleLbl name="callout">
+    <dgm:fillClrLst meth="repeat">
+      <a:schemeClr val="accent1"/>
+    </dgm:fillClrLst>
+    <dgm:linClrLst meth="repeat">
+      <a:schemeClr val="accent1">
+        <a:tint val="50000"/>
+      </a:schemeClr>
+    </dgm:linClrLst>
+    <dgm:effectClrLst/>
+    <dgm:txLinClrLst/>
+    <dgm:txFillClrLst meth="repeat">
+      <a:schemeClr val="tx1"/>
+    </dgm:txFillClrLst>
+    <dgm:txEffectClrLst/>
+  </dgm:styleLbl>
+  <dgm:styleLbl name="asst0">
+    <dgm:fillClrLst meth="repeat">
+      <a:schemeClr val="accent1"/>
+    </dgm:fillClrLst>
+    <dgm:linClrLst meth="repeat">
+      <a:schemeClr val="lt1"/>
+    </dgm:linClrLst>
+    <dgm:effectClrLst/>
+    <dgm:txLinClrLst/>
+    <dgm:txFillClrLst/>
+    <dgm:txEffectClrLst/>
+  </dgm:styleLbl>
+  <dgm:styleLbl name="asst1">
+    <dgm:fillClrLst meth="repeat">
+      <a:schemeClr val="accent1"/>
+    </dgm:fillClrLst>
+    <dgm:linClrLst meth="repeat">
+      <a:schemeClr val="lt1"/>
+    </dgm:linClrLst>
+    <dgm:effectClrLst/>
+    <dgm:txLinClrLst/>
+    <dgm:txFillClrLst/>
+    <dgm:txEffectClrLst/>
+  </dgm:styleLbl>
+  <dgm:styleLbl name="asst2">
+    <dgm:fillClrLst meth="repeat">
+      <a:schemeClr val="accent1"/>
+    </dgm:fillClrLst>
+    <dgm:linClrLst meth="repeat">
+      <a:schemeClr val="lt1"/>
+    </dgm:linClrLst>
+    <dgm:effectClrLst/>
+    <dgm:txLinClrLst/>
+    <dgm:txFillClrLst/>
+    <dgm:txEffectClrLst/>
+  </dgm:styleLbl>
+  <dgm:styleLbl name="asst3">
+    <dgm:fillClrLst meth="repeat">
+      <a:schemeClr val="accent1"/>
+    </dgm:fillClrLst>
+    <dgm:linClrLst meth="repeat">
+      <a:schemeClr val="lt1"/>
+    </dgm:linClrLst>
+    <dgm:effectClrLst/>
+    <dgm:txLinClrLst/>
+    <dgm:txFillClrLst/>
+    <dgm:txEffectClrLst/>
+  </dgm:styleLbl>
+  <dgm:styleLbl name="asst4">
+    <dgm:fillClrLst meth="repeat">
+      <a:schemeClr val="accent1"/>
+    </dgm:fillClrLst>
+    <dgm:linClrLst meth="repeat">
+      <a:schemeClr val="lt1"/>
+    </dgm:linClrLst>
+    <dgm:effectClrLst/>
+    <dgm:txLinClrLst/>
+    <dgm:txFillClrLst/>
+    <dgm:txEffectClrLst/>
+  </dgm:styleLbl>
+  <dgm:styleLbl name="parChTrans2D1">
+    <dgm:fillClrLst meth="repeat">
+      <a:schemeClr val="accent1">
+        <a:tint val="60000"/>
+      </a:schemeClr>
+    </dgm:fillClrLst>
+    <dgm:linClrLst meth="repeat">
+      <a:schemeClr val="accent1">
+        <a:tint val="60000"/>
+      </a:schemeClr>
+    </dgm:linClrLst>
+    <dgm:effectClrLst/>
+    <dgm:txLinClrLst/>
+    <dgm:txFillClrLst meth="repeat">
+      <a:schemeClr val="lt1"/>
+    </dgm:txFillClrLst>
+    <dgm:txEffectClrLst/>
+  </dgm:styleLbl>
+  <dgm:styleLbl name="parChTrans2D2">
+    <dgm:fillClrLst meth="repeat">
+      <a:schemeClr val="accent1"/>
+    </dgm:fillClrLst>
+    <dgm:linClrLst meth="repeat">
+      <a:schemeClr val="accent1"/>
+    </dgm:linClrLst>
+    <dgm:effectClrLst/>
+    <dgm:txLinClrLst/>
+    <dgm:txFillClrLst meth="repeat">
+      <a:schemeClr val="lt1"/>
+    </dgm:txFillClrLst>
+    <dgm:txEffectClrLst/>
+  </dgm:styleLbl>
+  <dgm:styleLbl name="parChTrans2D3">
+    <dgm:fillClrLst meth="repeat">
+      <a:schemeClr val="accent1"/>
+    </dgm:fillClrLst>
+    <dgm:linClrLst meth="repeat">
+      <a:schemeClr val="accent1"/>
+    </dgm:linClrLst>
+    <dgm:effectClrLst/>
+    <dgm:txLinClrLst/>
+    <dgm:txFillClrLst meth="repeat">
+      <a:schemeClr val="lt1"/>
+    </dgm:txFillClrLst>
+    <dgm:txEffectClrLst/>
+  </dgm:styleLbl>
+  <dgm:styleLbl name="parChTrans2D4">
+    <dgm:fillClrLst meth="repeat">
+      <a:schemeClr val="accent1"/>
+    </dgm:fillClrLst>
+    <dgm:linClrLst meth="repeat">
+      <a:schemeClr val="accent1"/>
+    </dgm:linClrLst>
+    <dgm:effectClrLst/>
+    <dgm:txLinClrLst/>
+    <dgm:txFillClrLst meth="repeat">
+      <a:schemeClr val="lt1"/>
+    </dgm:txFillClrLst>
+    <dgm:txEffectClrLst/>
+  </dgm:styleLbl>
+  <dgm:styleLbl name="parChTrans1D1">
+    <dgm:fillClrLst meth="repeat">
+      <a:schemeClr val="accent1"/>
+    </dgm:fillClrLst>
+    <dgm:linClrLst meth="repeat">
+      <a:schemeClr val="accent1">
+        <a:shade val="60000"/>
+      </a:schemeClr>
+    </dgm:linClrLst>
+    <dgm:effectClrLst/>
+    <dgm:txLinClrLst/>
+    <dgm:txFillClrLst meth="repeat">
+      <a:schemeClr val="tx1"/>
+    </dgm:txFillClrLst>
+    <dgm:txEffectClrLst/>
+  </dgm:styleLbl>
+  <dgm:styleLbl name="parChTrans1D2">
+    <dgm:fillClrLst meth="repeat">
+      <a:schemeClr val="accent1"/>
+    </dgm:fillClrLst>
+    <dgm:linClrLst meth="repeat">
+      <a:schemeClr val="accent1">
+        <a:shade val="60000"/>
+      </a:schemeClr>
+    </dgm:linClrLst>
+    <dgm:effectClrLst/>
+    <dgm:txLinClrLst/>
+    <dgm:txFillClrLst meth="repeat">
+      <a:schemeClr val="tx1"/>
+    </dgm:txFillClrLst>
+    <dgm:txEffectClrLst/>
+  </dgm:styleLbl>
+  <dgm:styleLbl name="parChTrans1D3">
+    <dgm:fillClrLst meth="repeat">
+      <a:schemeClr val="accent1"/>
+    </dgm:fillClrLst>
+    <dgm:linClrLst meth="repeat">
+      <a:schemeClr val="accent1">
+        <a:shade val="80000"/>
+      </a:schemeClr>
+    </dgm:linClrLst>
+    <dgm:effectClrLst/>
+    <dgm:txLinClrLst/>
+    <dgm:txFillClrLst meth="repeat">
+      <a:schemeClr val="tx1"/>
+    </dgm:txFillClrLst>
+    <dgm:txEffectClrLst/>
+  </dgm:styleLbl>
+  <dgm:styleLbl name="parChTrans1D4">
+    <dgm:fillClrLst meth="repeat">
+      <a:schemeClr val="accent1"/>
+    </dgm:fillClrLst>
+    <dgm:linClrLst meth="repeat">
+      <a:schemeClr val="accent1">
+        <a:shade val="80000"/>
+      </a:schemeClr>
+    </dgm:linClrLst>
+    <dgm:effectClrLst/>
+    <dgm:txLinClrLst/>
+    <dgm:txFillClrLst meth="repeat">
+      <a:schemeClr val="tx1"/>
+    </dgm:txFillClrLst>
+    <dgm:txEffectClrLst/>
+  </dgm:styleLbl>
+  <dgm:styleLbl name="fgAcc1">
+    <dgm:fillClrLst meth="repeat">
+      <a:schemeClr val="lt1">
+        <a:alpha val="90000"/>
+      </a:schemeClr>
+    </dgm:fillClrLst>
+    <dgm:linClrLst meth="repeat">
+      <a:schemeClr val="accent1"/>
+    </dgm:linClrLst>
+    <dgm:effectClrLst/>
+    <dgm:txLinClrLst/>
+    <dgm:txFillClrLst meth="repeat">
+      <a:schemeClr val="dk1"/>
+    </dgm:txFillClrLst>
+    <dgm:txEffectClrLst/>
+  </dgm:styleLbl>
+  <dgm:styleLbl name="conFgAcc1">
+    <dgm:fillClrLst meth="repeat">
+      <a:schemeClr val="lt1">
+        <a:alpha val="90000"/>
+      </a:schemeClr>
+    </dgm:fillClrLst>
+    <dgm:linClrLst meth="repeat">
+      <a:schemeClr val="accent1"/>
+    </dgm:linClrLst>
+    <dgm:effectClrLst/>
+    <dgm:txLinClrLst/>
+    <dgm:txFillClrLst meth="repeat">
+      <a:schemeClr val="dk1"/>
+    </dgm:txFillClrLst>
+    <dgm:txEffectClrLst/>
+  </dgm:styleLbl>
+  <dgm:styleLbl name="alignAcc1">
+    <dgm:fillClrLst meth="repeat">
+      <a:schemeClr val="lt1">
+        <a:alpha val="90000"/>
+      </a:schemeClr>
+    </dgm:fillClrLst>
+    <dgm:linClrLst meth="repeat">
+      <a:schemeClr val="accent1"/>
+    </dgm:linClrLst>
+    <dgm:effectClrLst/>
+    <dgm:txLinClrLst/>
+    <dgm:txFillClrLst meth="repeat">
+      <a:schemeClr val="dk1"/>
+    </dgm:txFillClrLst>
+    <dgm:txEffectClrLst/>
+  </dgm:styleLbl>
+  <dgm:styleLbl name="trAlignAcc1">
+    <dgm:fillClrLst meth="repeat">
+      <a:schemeClr val="lt1">
+        <a:alpha val="40000"/>
+      </a:schemeClr>
+    </dgm:fillClrLst>
+    <dgm:linClrLst meth="repeat">
+      <a:schemeClr val="accent1"/>
+    </dgm:linClrLst>
+    <dgm:effectClrLst/>
+    <dgm:txLinClrLst/>
+    <dgm:txFillClrLst meth="repeat">
+      <a:schemeClr val="dk1"/>
+    </dgm:txFillClrLst>
+    <dgm:txEffectClrLst/>
+  </dgm:styleLbl>
+  <dgm:styleLbl name="bgAcc1">
+    <dgm:fillClrLst meth="repeat">
+      <a:schemeClr val="lt1">
+        <a:alpha val="90000"/>
+      </a:schemeClr>
+    </dgm:fillClrLst>
+    <dgm:linClrLst meth="repeat">
+      <a:schemeClr val="accent1"/>
+    </dgm:linClrLst>
+    <dgm:effectClrLst/>
+    <dgm:txLinClrLst/>
+    <dgm:txFillClrLst meth="repeat">
+      <a:schemeClr val="dk1"/>
+    </dgm:txFillClrLst>
+    <dgm:txEffectClrLst/>
+  </dgm:styleLbl>
+  <dgm:styleLbl name="solidFgAcc1">
+    <dgm:fillClrLst meth="repeat">
+      <a:schemeClr val="lt1"/>
+    </dgm:fillClrLst>
+    <dgm:linClrLst meth="repeat">
+      <a:schemeClr val="accent1"/>
+    </dgm:linClrLst>
+    <dgm:effectClrLst/>
+    <dgm:txLinClrLst/>
+    <dgm:txFillClrLst meth="repeat">
+      <a:schemeClr val="dk1"/>
+    </dgm:txFillClrLst>
+    <dgm:txEffectClrLst/>
+  </dgm:styleLbl>
+  <dgm:styleLbl name="solidAlignAcc1">
+    <dgm:fillClrLst meth="repeat">
+      <a:schemeClr val="lt1"/>
+    </dgm:fillClrLst>
+    <dgm:linClrLst meth="repeat">
+      <a:schemeClr val="accent1"/>
+    </dgm:linClrLst>
+    <dgm:effectClrLst/>
+    <dgm:txLinClrLst/>
+    <dgm:txFillClrLst meth="repeat">
+      <a:schemeClr val="dk1"/>
+    </dgm:txFillClrLst>
+    <dgm:txEffectClrLst/>
+  </dgm:styleLbl>
+  <dgm:styleLbl name="solidBgAcc1">
+    <dgm:fillClrLst meth="repeat">
+      <a:schemeClr val="lt1"/>
+    </dgm:fillClrLst>
+    <dgm:linClrLst meth="repeat">
+      <a:schemeClr val="accent1"/>
+    </dgm:linClrLst>
+    <dgm:effectClrLst/>
+    <dgm:txLinClrLst/>
+    <dgm:txFillClrLst meth="repeat">
+      <a:schemeClr val="dk1"/>
+    </dgm:txFillClrLst>
+    <dgm:txEffectClrLst/>
+  </dgm:styleLbl>
+  <dgm:styleLbl name="fgAccFollowNode1">
+    <dgm:fillClrLst meth="repeat">
+      <a:schemeClr val="accent1">
+        <a:alpha val="90000"/>
+        <a:tint val="40000"/>
+      </a:schemeClr>
+    </dgm:fillClrLst>
+    <dgm:linClrLst meth="repeat">
+      <a:schemeClr val="accent1">
+        <a:alpha val="90000"/>
+        <a:tint val="40000"/>
+      </a:schemeClr>
+    </dgm:linClrLst>
+    <dgm:effectClrLst/>
+    <dgm:txLinClrLst/>
+    <dgm:txFillClrLst meth="repeat">
+      <a:schemeClr val="dk1"/>
+    </dgm:txFillClrLst>
+    <dgm:txEffectClrLst/>
+  </dgm:styleLbl>
+  <dgm:styleLbl name="alignAccFollowNode1">
+    <dgm:fillClrLst meth="repeat">
+      <a:schemeClr val="accent1">
+        <a:alpha val="90000"/>
+        <a:tint val="40000"/>
+      </a:schemeClr>
+    </dgm:fillClrLst>
+    <dgm:linClrLst meth="repeat">
+      <a:schemeClr val="accent1">
+        <a:alpha val="90000"/>
+        <a:tint val="40000"/>
+      </a:schemeClr>
+    </dgm:linClrLst>
+    <dgm:effectClrLst/>
+    <dgm:txLinClrLst/>
+    <dgm:txFillClrLst meth="repeat">
+      <a:schemeClr val="dk1"/>
+    </dgm:txFillClrLst>
+    <dgm:txEffectClrLst/>
+  </dgm:styleLbl>
+  <dgm:styleLbl name="bgAccFollowNode1">
+    <dgm:fillClrLst meth="repeat">
+      <a:schemeClr val="accent1">
+        <a:alpha val="90000"/>
+        <a:tint val="40000"/>
+      </a:schemeClr>
+    </dgm:fillClrLst>
+    <dgm:linClrLst meth="repeat">
+      <a:schemeClr val="accent1">
+        <a:alpha val="90000"/>
+        <a:tint val="40000"/>
+      </a:schemeClr>
+    </dgm:linClrLst>
+    <dgm:effectClrLst/>
+    <dgm:txLinClrLst/>
+    <dgm:txFillClrLst meth="repeat">
+      <a:schemeClr val="dk1"/>
+    </dgm:txFillClrLst>
+    <dgm:txEffectClrLst/>
+  </dgm:styleLbl>
+  <dgm:styleLbl name="fgAcc0">
+    <dgm:fillClrLst meth="repeat">
+      <a:schemeClr val="lt1">
+        <a:alpha val="90000"/>
+      </a:schemeClr>
+    </dgm:fillClrLst>
+    <dgm:linClrLst meth="repeat">
+      <a:schemeClr val="accent1"/>
+    </dgm:linClrLst>
+    <dgm:effectClrLst/>
+    <dgm:txLinClrLst/>
+    <dgm:txFillClrLst meth="repeat">
+      <a:schemeClr val="dk1"/>
+    </dgm:txFillClrLst>
+    <dgm:txEffectClrLst/>
+  </dgm:styleLbl>
+  <dgm:styleLbl name="fgAcc2">
+    <dgm:fillClrLst meth="repeat">
+      <a:schemeClr val="lt1">
+        <a:alpha val="90000"/>
+      </a:schemeClr>
+    </dgm:fillClrLst>
+    <dgm:linClrLst meth="repeat">
+      <a:schemeClr val="accent1"/>
+    </dgm:linClrLst>
+    <dgm:effectClrLst/>
+    <dgm:txLinClrLst/>
+    <dgm:txFillClrLst meth="repeat">
+      <a:schemeClr val="dk1"/>
+    </dgm:txFillClrLst>
+    <dgm:txEffectClrLst/>
+  </dgm:styleLbl>
+  <dgm:styleLbl name="fgAcc3">
+    <dgm:fillClrLst meth="repeat">
+      <a:schemeClr val="lt1">
+        <a:alpha val="90000"/>
+      </a:schemeClr>
+    </dgm:fillClrLst>
+    <dgm:linClrLst meth="repeat">
+      <a:schemeClr val="accent1"/>
+    </dgm:linClrLst>
+    <dgm:effectClrLst/>
+    <dgm:txLinClrLst/>
+    <dgm:txFillClrLst meth="repeat">
+      <a:schemeClr val="dk1"/>
+    </dgm:txFillClrLst>
+    <dgm:txEffectClrLst/>
+  </dgm:styleLbl>
+  <dgm:styleLbl name="fgAcc4">
+    <dgm:fillClrLst meth="repeat">
+      <a:schemeClr val="lt1">
+        <a:alpha val="90000"/>
+      </a:schemeClr>
+    </dgm:fillClrLst>
+    <dgm:linClrLst meth="repeat">
+      <a:schemeClr val="accent1"/>
+    </dgm:linClrLst>
+    <dgm:effectClrLst/>
+    <dgm:txLinClrLst/>
+    <dgm:txFillClrLst meth="repeat">
+      <a:schemeClr val="dk1"/>
+    </dgm:txFillClrLst>
+    <dgm:txEffectClrLst/>
+  </dgm:styleLbl>
+  <dgm:styleLbl name="bgShp">
+    <dgm:fillClrLst meth="repeat">
+      <a:schemeClr val="accent1">
+        <a:tint val="40000"/>
+      </a:schemeClr>
+    </dgm:fillClrLst>
+    <dgm:linClrLst meth="repeat">
+      <a:schemeClr val="accent1"/>
+    </dgm:linClrLst>
+    <dgm:effectClrLst/>
+    <dgm:txLinClrLst/>
+    <dgm:txFillClrLst meth="repeat">
+      <a:schemeClr val="dk1"/>
+    </dgm:txFillClrLst>
+    <dgm:txEffectClrLst/>
+  </dgm:styleLbl>
+  <dgm:styleLbl name="dkBgShp">
+    <dgm:fillClrLst meth="repeat">
+      <a:schemeClr val="accent1">
+        <a:shade val="80000"/>
+      </a:schemeClr>
+    </dgm:fillClrLst>
+    <dgm:linClrLst meth="repeat">
+      <a:schemeClr val="accent1"/>
+    </dgm:linClrLst>
+    <dgm:effectClrLst/>
+    <dgm:txLinClrLst/>
+    <dgm:txFillClrLst meth="repeat">
+      <a:schemeClr val="lt1"/>
+    </dgm:txFillClrLst>
+    <dgm:txEffectClrLst/>
+  </dgm:styleLbl>
+  <dgm:styleLbl name="trBgShp">
+    <dgm:fillClrLst meth="repeat">
+      <a:schemeClr val="accent1">
+        <a:tint val="50000"/>
+        <a:alpha val="40000"/>
+      </a:schemeClr>
+    </dgm:fillClrLst>
+    <dgm:linClrLst meth="repeat">
+      <a:schemeClr val="accent1"/>
+    </dgm:linClrLst>
+    <dgm:effectClrLst/>
+    <dgm:txLinClrLst/>
+    <dgm:txFillClrLst meth="repeat">
+      <a:schemeClr val="lt1"/>
+    </dgm:txFillClrLst>
+    <dgm:txEffectClrLst/>
+  </dgm:styleLbl>
+  <dgm:styleLbl name="fgShp">
+    <dgm:fillClrLst meth="repeat">
+      <a:schemeClr val="accent1">
+        <a:tint val="60000"/>
+      </a:schemeClr>
+    </dgm:fillClrLst>
+    <dgm:linClrLst meth="repeat">
+      <a:schemeClr val="lt1"/>
+    </dgm:linClrLst>
+    <dgm:effectClrLst/>
+    <dgm:txLinClrLst/>
+    <dgm:txFillClrLst meth="repeat">
+      <a:schemeClr val="dk1"/>
+    </dgm:txFillClrLst>
+    <dgm:txEffectClrLst/>
+  </dgm:styleLbl>
+  <dgm:styleLbl name="revTx">
+    <dgm:fillClrLst meth="repeat">
+      <a:schemeClr val="lt1">
+        <a:alpha val="0"/>
+      </a:schemeClr>
+    </dgm:fillClrLst>
+    <dgm:linClrLst meth="repeat">
+      <a:schemeClr val="dk1">
+        <a:alpha val="0"/>
+      </a:schemeClr>
+    </dgm:linClrLst>
+    <dgm:effectClrLst/>
+    <dgm:txLinClrLst/>
+    <dgm:txFillClrLst meth="repeat">
+      <a:schemeClr val="tx1"/>
+    </dgm:txFillClrLst>
+    <dgm:txEffectClrLst/>
+  </dgm:styleLbl>
+</dgm:colorsDef>
+</file>
+
 <file path=ppt/diagrams/colors2.xml><?xml version="1.0" encoding="utf-8"?>
 <dgm:colorsDef xmlns:dgm="http://schemas.openxmlformats.org/drawingml/2006/diagram" xmlns:a="http://schemas.openxmlformats.org/drawingml/2006/main" uniqueId="urn:microsoft.com/office/officeart/2005/8/colors/accent1_2">
   <dgm:title val=""/>
@@ -3462,8 +4209,8 @@
         </a:p>
       </dgm:t>
     </dgm:pt>
-    <mc:AlternateContent xmlns:mc="http://schemas.openxmlformats.org/markup-compatibility/2006">
-      <mc:Choice xmlns:a14="http://schemas.microsoft.com/office/drawing/2010/main" Requires="a14">
+    <mc:AlternateContent xmlns:mc="http://schemas.openxmlformats.org/markup-compatibility/2006" xmlns:a14="http://schemas.microsoft.com/office/drawing/2010/main">
+      <mc:Choice Requires="a14">
         <dgm:pt modelId="{4D0135C1-88F1-4607-A4C2-2F8749A88B05}">
           <dgm:prSet/>
           <dgm:spPr/>
@@ -3482,20 +4229,26 @@
               <a14:m>
                 <m:oMath xmlns:m="http://schemas.openxmlformats.org/officeDocument/2006/math">
                   <m:r>
-                    <a:rPr lang="en-US" b="0" i="0"/>
+                    <a:rPr lang="en-US" b="0" i="0">
+                      <a:latin typeface="Cambria Math" panose="02040503050406030204" pitchFamily="18" charset="0"/>
+                    </a:rPr>
                     <m:t>(</m:t>
                   </m:r>
                   <m:r>
                     <m:rPr>
                       <m:sty m:val="p"/>
                     </m:rPr>
-                    <a:rPr lang="en-US" b="0" i="0"/>
+                    <a:rPr lang="en-US" b="0" i="0">
+                      <a:latin typeface="Cambria Math" panose="02040503050406030204" pitchFamily="18" charset="0"/>
+                    </a:rPr>
                     <m:t>Δ</m:t>
                   </m:r>
                   <m:sSub>
                     <m:sSubPr>
                       <m:ctrlPr>
-                        <a:rPr lang="en-US" b="0" i="1"/>
+                        <a:rPr lang="en-US" b="0" i="1">
+                          <a:latin typeface="Cambria Math" panose="02040503050406030204" pitchFamily="18" charset="0"/>
+                        </a:rPr>
                       </m:ctrlPr>
                     </m:sSubPr>
                     <m:e>
@@ -3503,7 +4256,9 @@
                         <m:rPr>
                           <m:sty m:val="p"/>
                         </m:rPr>
-                        <a:rPr lang="en-US" b="0" i="0"/>
+                        <a:rPr lang="en-US" b="0" i="0">
+                          <a:latin typeface="Cambria Math" panose="02040503050406030204" pitchFamily="18" charset="0"/>
+                        </a:rPr>
                         <m:t>t</m:t>
                       </m:r>
                     </m:e>
@@ -3512,13 +4267,17 @@
                         <m:rPr>
                           <m:sty m:val="p"/>
                         </m:rPr>
-                        <a:rPr lang="en-US" b="0" i="0"/>
+                        <a:rPr lang="en-US" b="0" i="0">
+                          <a:latin typeface="Cambria Math" panose="02040503050406030204" pitchFamily="18" charset="0"/>
+                        </a:rPr>
                         <m:t>bl</m:t>
                       </m:r>
                     </m:sub>
                   </m:sSub>
                   <m:r>
-                    <a:rPr lang="en-US" b="0" i="0"/>
+                    <a:rPr lang="en-US" b="0" i="0">
+                      <a:latin typeface="Cambria Math" panose="02040503050406030204" pitchFamily="18" charset="0"/>
+                    </a:rPr>
                     <m:t>)</m:t>
                   </m:r>
                 </m:oMath>
@@ -3531,7 +4290,7 @@
           </dgm:t>
         </dgm:pt>
       </mc:Choice>
-      <mc:Fallback>
+      <mc:Fallback xmlns="">
         <dgm:pt modelId="{4D0135C1-88F1-4607-A4C2-2F8749A88B05}">
           <dgm:prSet/>
           <dgm:spPr/>
@@ -3654,8 +4413,8 @@
         </a:p>
       </dgm:t>
     </dgm:pt>
-    <mc:AlternateContent xmlns:mc="http://schemas.openxmlformats.org/markup-compatibility/2006">
-      <mc:Choice xmlns:a14="http://schemas.microsoft.com/office/drawing/2010/main" Requires="a14">
+    <mc:AlternateContent xmlns:mc="http://schemas.openxmlformats.org/markup-compatibility/2006" xmlns:a14="http://schemas.microsoft.com/office/drawing/2010/main">
+      <mc:Choice Requires="a14">
         <dgm:pt modelId="{39C4754D-B3FF-49F4-895F-767F799E6C22}">
           <dgm:prSet/>
           <dgm:spPr/>
@@ -3663,6 +4422,7 @@
             <a:bodyPr/>
             <a:lstStyle/>
             <a:p>
+              <a:pPr/>
               <a14:m>
                 <m:oMathPara xmlns:m="http://schemas.openxmlformats.org/officeDocument/2006/math">
                   <m:oMathParaPr>
@@ -3684,7 +4444,7 @@
                     <m:f>
                       <m:fPr>
                         <m:ctrlPr>
-                          <a:rPr lang="en-US" b="0" i="0" smtClean="0">
+                          <a:rPr lang="en-US" b="0" i="1" smtClean="0">
                             <a:latin typeface="Cambria Math" panose="02040503050406030204" pitchFamily="18" charset="0"/>
                           </a:rPr>
                         </m:ctrlPr>
@@ -3889,7 +4649,7 @@
           </dgm:t>
         </dgm:pt>
       </mc:Choice>
-      <mc:Fallback>
+      <mc:Fallback xmlns="">
         <dgm:pt modelId="{39C4754D-B3FF-49F4-895F-767F799E6C22}">
           <dgm:prSet/>
           <dgm:spPr/>
@@ -5060,7 +5820,7 @@
               <m:f>
                 <m:fPr>
                   <m:ctrlPr>
-                    <a:rPr lang="en-US" sz="1700" b="0" i="0" kern="1200" smtClean="0">
+                    <a:rPr lang="en-US" sz="1700" b="0" i="1" kern="1200" smtClean="0">
                       <a:latin typeface="Cambria Math" panose="02040503050406030204" pitchFamily="18" charset="0"/>
                     </a:rPr>
                   </m:ctrlPr>
@@ -5363,20 +6123,26 @@
           <a14:m xmlns:a14="http://schemas.microsoft.com/office/drawing/2010/main">
             <m:oMath xmlns:m="http://schemas.openxmlformats.org/officeDocument/2006/math">
               <m:r>
-                <a:rPr lang="en-US" sz="2100" b="0" i="0" kern="1200"/>
+                <a:rPr lang="en-US" sz="2100" b="0" i="0" kern="1200">
+                  <a:latin typeface="Cambria Math" panose="02040503050406030204" pitchFamily="18" charset="0"/>
+                </a:rPr>
                 <m:t>(</m:t>
               </m:r>
               <m:r>
                 <m:rPr>
                   <m:sty m:val="p"/>
                 </m:rPr>
-                <a:rPr lang="en-US" sz="2100" b="0" i="0" kern="1200"/>
+                <a:rPr lang="en-US" sz="2100" b="0" i="0" kern="1200">
+                  <a:latin typeface="Cambria Math" panose="02040503050406030204" pitchFamily="18" charset="0"/>
+                </a:rPr>
                 <m:t>Δ</m:t>
               </m:r>
               <m:sSub>
                 <m:sSubPr>
                   <m:ctrlPr>
-                    <a:rPr lang="en-US" sz="2100" b="0" i="1" kern="1200"/>
+                    <a:rPr lang="en-US" sz="2100" b="0" i="1" kern="1200">
+                      <a:latin typeface="Cambria Math" panose="02040503050406030204" pitchFamily="18" charset="0"/>
+                    </a:rPr>
                   </m:ctrlPr>
                 </m:sSubPr>
                 <m:e>
@@ -5384,7 +6150,9 @@
                     <m:rPr>
                       <m:sty m:val="p"/>
                     </m:rPr>
-                    <a:rPr lang="en-US" sz="2100" b="0" i="0" kern="1200"/>
+                    <a:rPr lang="en-US" sz="2100" b="0" i="0" kern="1200">
+                      <a:latin typeface="Cambria Math" panose="02040503050406030204" pitchFamily="18" charset="0"/>
+                    </a:rPr>
                     <m:t>t</m:t>
                   </m:r>
                 </m:e>
@@ -5393,13 +6161,17 @@
                     <m:rPr>
                       <m:sty m:val="p"/>
                     </m:rPr>
-                    <a:rPr lang="en-US" sz="2100" b="0" i="0" kern="1200"/>
+                    <a:rPr lang="en-US" sz="2100" b="0" i="0" kern="1200">
+                      <a:latin typeface="Cambria Math" panose="02040503050406030204" pitchFamily="18" charset="0"/>
+                    </a:rPr>
                     <m:t>bl</m:t>
                   </m:r>
                 </m:sub>
               </m:sSub>
               <m:r>
-                <a:rPr lang="en-US" sz="2100" b="0" i="0" kern="1200"/>
+                <a:rPr lang="en-US" sz="2100" b="0" i="0" kern="1200">
+                  <a:latin typeface="Cambria Math" panose="02040503050406030204" pitchFamily="18" charset="0"/>
+                </a:rPr>
                 <m:t>)</m:t>
               </m:r>
             </m:oMath>
@@ -6200,6 +6972,239 @@
 </dgm:layoutDef>
 </file>
 
+<file path=ppt/diagrams/layout10.xml><?xml version="1.0" encoding="utf-8"?>
+<dgm:layoutDef xmlns:dgm="http://schemas.openxmlformats.org/drawingml/2006/diagram" xmlns:a="http://schemas.openxmlformats.org/drawingml/2006/main" uniqueId="urn:microsoft.com/office/officeart/2005/8/layout/vList5">
+  <dgm:title val=""/>
+  <dgm:desc val=""/>
+  <dgm:catLst>
+    <dgm:cat type="list" pri="15000"/>
+    <dgm:cat type="convert" pri="2000"/>
+  </dgm:catLst>
+  <dgm:sampData>
+    <dgm:dataModel>
+      <dgm:ptLst>
+        <dgm:pt modelId="0" type="doc"/>
+        <dgm:pt modelId="1">
+          <dgm:prSet phldr="1"/>
+        </dgm:pt>
+        <dgm:pt modelId="11">
+          <dgm:prSet phldr="1"/>
+        </dgm:pt>
+        <dgm:pt modelId="12">
+          <dgm:prSet phldr="1"/>
+        </dgm:pt>
+        <dgm:pt modelId="2">
+          <dgm:prSet phldr="1"/>
+        </dgm:pt>
+        <dgm:pt modelId="21">
+          <dgm:prSet phldr="1"/>
+        </dgm:pt>
+        <dgm:pt modelId="22">
+          <dgm:prSet phldr="1"/>
+        </dgm:pt>
+        <dgm:pt modelId="3">
+          <dgm:prSet phldr="1"/>
+        </dgm:pt>
+        <dgm:pt modelId="31">
+          <dgm:prSet phldr="1"/>
+        </dgm:pt>
+        <dgm:pt modelId="32">
+          <dgm:prSet phldr="1"/>
+        </dgm:pt>
+      </dgm:ptLst>
+      <dgm:cxnLst>
+        <dgm:cxn modelId="4" srcId="0" destId="1" srcOrd="0" destOrd="0"/>
+        <dgm:cxn modelId="5" srcId="0" destId="2" srcOrd="1" destOrd="0"/>
+        <dgm:cxn modelId="6" srcId="0" destId="3" srcOrd="2" destOrd="0"/>
+        <dgm:cxn modelId="13" srcId="1" destId="11" srcOrd="0" destOrd="0"/>
+        <dgm:cxn modelId="14" srcId="1" destId="12" srcOrd="1" destOrd="0"/>
+        <dgm:cxn modelId="23" srcId="2" destId="21" srcOrd="0" destOrd="0"/>
+        <dgm:cxn modelId="24" srcId="2" destId="22" srcOrd="1" destOrd="0"/>
+        <dgm:cxn modelId="33" srcId="3" destId="31" srcOrd="0" destOrd="0"/>
+        <dgm:cxn modelId="34" srcId="3" destId="32" srcOrd="1" destOrd="0"/>
+      </dgm:cxnLst>
+      <dgm:bg/>
+      <dgm:whole/>
+    </dgm:dataModel>
+  </dgm:sampData>
+  <dgm:styleData>
+    <dgm:dataModel>
+      <dgm:ptLst>
+        <dgm:pt modelId="0" type="doc"/>
+        <dgm:pt modelId="1"/>
+        <dgm:pt modelId="11"/>
+        <dgm:pt modelId="2"/>
+        <dgm:pt modelId="21"/>
+      </dgm:ptLst>
+      <dgm:cxnLst>
+        <dgm:cxn modelId="4" srcId="0" destId="1" srcOrd="0" destOrd="0"/>
+        <dgm:cxn modelId="5" srcId="0" destId="2" srcOrd="1" destOrd="0"/>
+        <dgm:cxn modelId="13" srcId="1" destId="11" srcOrd="0" destOrd="0"/>
+        <dgm:cxn modelId="23" srcId="2" destId="21" srcOrd="0" destOrd="0"/>
+      </dgm:cxnLst>
+      <dgm:bg/>
+      <dgm:whole/>
+    </dgm:dataModel>
+  </dgm:styleData>
+  <dgm:clrData>
+    <dgm:dataModel>
+      <dgm:ptLst>
+        <dgm:pt modelId="0" type="doc"/>
+        <dgm:pt modelId="1"/>
+        <dgm:pt modelId="11"/>
+        <dgm:pt modelId="2"/>
+        <dgm:pt modelId="21"/>
+        <dgm:pt modelId="3"/>
+        <dgm:pt modelId="31"/>
+        <dgm:pt modelId="4"/>
+        <dgm:pt modelId="41"/>
+      </dgm:ptLst>
+      <dgm:cxnLst>
+        <dgm:cxn modelId="5" srcId="0" destId="1" srcOrd="0" destOrd="0"/>
+        <dgm:cxn modelId="6" srcId="0" destId="2" srcOrd="1" destOrd="0"/>
+        <dgm:cxn modelId="7" srcId="0" destId="3" srcOrd="2" destOrd="0"/>
+        <dgm:cxn modelId="8" srcId="0" destId="4" srcOrd="3" destOrd="0"/>
+        <dgm:cxn modelId="13" srcId="1" destId="11" srcOrd="0" destOrd="0"/>
+        <dgm:cxn modelId="23" srcId="2" destId="21" srcOrd="0" destOrd="0"/>
+        <dgm:cxn modelId="33" srcId="3" destId="31" srcOrd="0" destOrd="0"/>
+        <dgm:cxn modelId="43" srcId="4" destId="41" srcOrd="0" destOrd="0"/>
+      </dgm:cxnLst>
+      <dgm:bg/>
+      <dgm:whole/>
+    </dgm:dataModel>
+  </dgm:clrData>
+  <dgm:layoutNode name="Name0">
+    <dgm:varLst>
+      <dgm:dir/>
+      <dgm:animLvl val="lvl"/>
+      <dgm:resizeHandles val="exact"/>
+    </dgm:varLst>
+    <dgm:choose name="Name1">
+      <dgm:if name="Name2" func="var" arg="dir" op="equ" val="norm">
+        <dgm:alg type="lin">
+          <dgm:param type="linDir" val="fromT"/>
+          <dgm:param type="nodeHorzAlign" val="l"/>
+        </dgm:alg>
+      </dgm:if>
+      <dgm:else name="Name3">
+        <dgm:alg type="lin">
+          <dgm:param type="linDir" val="fromT"/>
+          <dgm:param type="nodeHorzAlign" val="r"/>
+        </dgm:alg>
+      </dgm:else>
+    </dgm:choose>
+    <dgm:shape xmlns:r="http://schemas.openxmlformats.org/officeDocument/2006/relationships" r:blip="">
+      <dgm:adjLst/>
+    </dgm:shape>
+    <dgm:presOf/>
+    <dgm:constrLst>
+      <dgm:constr type="h" for="ch" forName="linNode" refType="h"/>
+      <dgm:constr type="w" for="ch" forName="linNode" refType="w"/>
+      <dgm:constr type="h" for="ch" forName="sp" refType="h" fact="0.05"/>
+      <dgm:constr type="primFontSz" for="des" forName="parentText" op="equ" val="65"/>
+      <dgm:constr type="secFontSz" for="des" forName="descendantText" op="equ"/>
+    </dgm:constrLst>
+    <dgm:ruleLst/>
+    <dgm:forEach name="Name4" axis="ch" ptType="node">
+      <dgm:layoutNode name="linNode">
+        <dgm:choose name="Name5">
+          <dgm:if name="Name6" func="var" arg="dir" op="equ" val="norm">
+            <dgm:alg type="lin">
+              <dgm:param type="linDir" val="fromL"/>
+            </dgm:alg>
+          </dgm:if>
+          <dgm:else name="Name7">
+            <dgm:alg type="lin">
+              <dgm:param type="linDir" val="fromR"/>
+            </dgm:alg>
+          </dgm:else>
+        </dgm:choose>
+        <dgm:shape xmlns:r="http://schemas.openxmlformats.org/officeDocument/2006/relationships" r:blip="">
+          <dgm:adjLst/>
+        </dgm:shape>
+        <dgm:presOf/>
+        <dgm:constrLst>
+          <dgm:constr type="w" for="ch" forName="parentText" refType="w" fact="0.36"/>
+          <dgm:constr type="w" for="ch" forName="descendantText" refType="w" fact="0.64"/>
+          <dgm:constr type="h" for="ch" forName="parentText" refType="h"/>
+          <dgm:constr type="h" for="ch" forName="descendantText" refType="h" refFor="ch" refForName="parentText" fact="0.8"/>
+        </dgm:constrLst>
+        <dgm:ruleLst/>
+        <dgm:layoutNode name="parentText">
+          <dgm:varLst>
+            <dgm:chMax val="1"/>
+            <dgm:bulletEnabled val="1"/>
+          </dgm:varLst>
+          <dgm:alg type="tx"/>
+          <dgm:shape xmlns:r="http://schemas.openxmlformats.org/officeDocument/2006/relationships" type="roundRect" r:blip="" zOrderOff="3">
+            <dgm:adjLst/>
+          </dgm:shape>
+          <dgm:presOf axis="self" ptType="node"/>
+          <dgm:constrLst>
+            <dgm:constr type="tMarg" refType="primFontSz" fact="0.15"/>
+            <dgm:constr type="bMarg" refType="primFontSz" fact="0.15"/>
+            <dgm:constr type="lMarg" refType="primFontSz" fact="0.3"/>
+            <dgm:constr type="rMarg" refType="primFontSz" fact="0.3"/>
+          </dgm:constrLst>
+          <dgm:ruleLst>
+            <dgm:rule type="primFontSz" val="5" fact="NaN" max="NaN"/>
+          </dgm:ruleLst>
+        </dgm:layoutNode>
+        <dgm:choose name="Name8">
+          <dgm:if name="Name9" axis="ch" ptType="node" func="cnt" op="gte" val="1">
+            <dgm:layoutNode name="descendantText" styleLbl="alignAccFollowNode1">
+              <dgm:varLst>
+                <dgm:bulletEnabled val="1"/>
+              </dgm:varLst>
+              <dgm:alg type="tx">
+                <dgm:param type="stBulletLvl" val="1"/>
+                <dgm:param type="txAnchorVertCh" val="mid"/>
+              </dgm:alg>
+              <dgm:choose name="Name10">
+                <dgm:if name="Name11" func="var" arg="dir" op="equ" val="norm">
+                  <dgm:shape xmlns:r="http://schemas.openxmlformats.org/officeDocument/2006/relationships" rot="90" type="round2SameRect" r:blip="">
+                    <dgm:adjLst/>
+                  </dgm:shape>
+                </dgm:if>
+                <dgm:else name="Name12">
+                  <dgm:shape xmlns:r="http://schemas.openxmlformats.org/officeDocument/2006/relationships" rot="-90" type="round2SameRect" r:blip="">
+                    <dgm:adjLst/>
+                  </dgm:shape>
+                </dgm:else>
+              </dgm:choose>
+              <dgm:presOf axis="des" ptType="node"/>
+              <dgm:constrLst>
+                <dgm:constr type="secFontSz" val="65"/>
+                <dgm:constr type="primFontSz" refType="secFontSz"/>
+                <dgm:constr type="lMarg" refType="secFontSz" fact="0.3"/>
+                <dgm:constr type="rMarg" refType="secFontSz" fact="0.3"/>
+                <dgm:constr type="tMarg" refType="secFontSz" fact="0.15"/>
+                <dgm:constr type="bMarg" refType="secFontSz" fact="0.15"/>
+              </dgm:constrLst>
+              <dgm:ruleLst>
+                <dgm:rule type="secFontSz" val="5" fact="NaN" max="NaN"/>
+              </dgm:ruleLst>
+            </dgm:layoutNode>
+          </dgm:if>
+          <dgm:else name="Name13"/>
+        </dgm:choose>
+      </dgm:layoutNode>
+      <dgm:forEach name="Name14" axis="followSib" ptType="sibTrans" cnt="1">
+        <dgm:layoutNode name="sp">
+          <dgm:alg type="sp"/>
+          <dgm:shape xmlns:r="http://schemas.openxmlformats.org/officeDocument/2006/relationships" r:blip="">
+            <dgm:adjLst/>
+          </dgm:shape>
+          <dgm:presOf/>
+          <dgm:constrLst/>
+          <dgm:ruleLst/>
+        </dgm:layoutNode>
+      </dgm:forEach>
+    </dgm:forEach>
+  </dgm:layoutNode>
+</dgm:layoutDef>
+</file>
+
 <file path=ppt/diagrams/layout2.xml><?xml version="1.0" encoding="utf-8"?>
 <dgm:layoutDef xmlns:dgm="http://schemas.openxmlformats.org/drawingml/2006/diagram" xmlns:a="http://schemas.openxmlformats.org/drawingml/2006/main" uniqueId="urn:microsoft.com/office/officeart/2005/8/layout/hProcess9">
   <dgm:title val=""/>
@@ -7621,6 +8626,1040 @@
 </dgm:styleDef>
 </file>
 
+<file path=ppt/diagrams/quickStyle10.xml><?xml version="1.0" encoding="utf-8"?>
+<dgm:styleDef xmlns:dgm="http://schemas.openxmlformats.org/drawingml/2006/diagram" xmlns:a="http://schemas.openxmlformats.org/drawingml/2006/main" uniqueId="urn:microsoft.com/office/officeart/2005/8/quickstyle/simple1">
+  <dgm:title val=""/>
+  <dgm:desc val=""/>
+  <dgm:catLst>
+    <dgm:cat type="simple" pri="10100"/>
+  </dgm:catLst>
+  <dgm:scene3d>
+    <a:camera prst="orthographicFront"/>
+    <a:lightRig rig="threePt" dir="t"/>
+  </dgm:scene3d>
+  <dgm:styleLbl name="node0">
+    <dgm:scene3d>
+      <a:camera prst="orthographicFront"/>
+      <a:lightRig rig="threePt" dir="t"/>
+    </dgm:scene3d>
+    <dgm:sp3d/>
+    <dgm:txPr/>
+    <dgm:style>
+      <a:lnRef idx="2">
+        <a:scrgbClr r="0" g="0" b="0"/>
+      </a:lnRef>
+      <a:fillRef idx="1">
+        <a:scrgbClr r="0" g="0" b="0"/>
+      </a:fillRef>
+      <a:effectRef idx="0">
+        <a:scrgbClr r="0" g="0" b="0"/>
+      </a:effectRef>
+      <a:fontRef idx="minor">
+        <a:schemeClr val="lt1"/>
+      </a:fontRef>
+    </dgm:style>
+  </dgm:styleLbl>
+  <dgm:styleLbl name="lnNode1">
+    <dgm:scene3d>
+      <a:camera prst="orthographicFront"/>
+      <a:lightRig rig="threePt" dir="t"/>
+    </dgm:scene3d>
+    <dgm:sp3d/>
+    <dgm:txPr/>
+    <dgm:style>
+      <a:lnRef idx="2">
+        <a:scrgbClr r="0" g="0" b="0"/>
+      </a:lnRef>
+      <a:fillRef idx="1">
+        <a:scrgbClr r="0" g="0" b="0"/>
+      </a:fillRef>
+      <a:effectRef idx="0">
+        <a:scrgbClr r="0" g="0" b="0"/>
+      </a:effectRef>
+      <a:fontRef idx="minor">
+        <a:schemeClr val="lt1"/>
+      </a:fontRef>
+    </dgm:style>
+  </dgm:styleLbl>
+  <dgm:styleLbl name="vennNode1">
+    <dgm:scene3d>
+      <a:camera prst="orthographicFront"/>
+      <a:lightRig rig="threePt" dir="t"/>
+    </dgm:scene3d>
+    <dgm:sp3d/>
+    <dgm:txPr/>
+    <dgm:style>
+      <a:lnRef idx="2">
+        <a:scrgbClr r="0" g="0" b="0"/>
+      </a:lnRef>
+      <a:fillRef idx="1">
+        <a:scrgbClr r="0" g="0" b="0"/>
+      </a:fillRef>
+      <a:effectRef idx="0">
+        <a:scrgbClr r="0" g="0" b="0"/>
+      </a:effectRef>
+      <a:fontRef idx="minor">
+        <a:schemeClr val="tx1"/>
+      </a:fontRef>
+    </dgm:style>
+  </dgm:styleLbl>
+  <dgm:styleLbl name="alignNode1">
+    <dgm:scene3d>
+      <a:camera prst="orthographicFront"/>
+      <a:lightRig rig="threePt" dir="t"/>
+    </dgm:scene3d>
+    <dgm:sp3d/>
+    <dgm:txPr/>
+    <dgm:style>
+      <a:lnRef idx="2">
+        <a:scrgbClr r="0" g="0" b="0"/>
+      </a:lnRef>
+      <a:fillRef idx="1">
+        <a:scrgbClr r="0" g="0" b="0"/>
+      </a:fillRef>
+      <a:effectRef idx="0">
+        <a:scrgbClr r="0" g="0" b="0"/>
+      </a:effectRef>
+      <a:fontRef idx="minor">
+        <a:schemeClr val="lt1"/>
+      </a:fontRef>
+    </dgm:style>
+  </dgm:styleLbl>
+  <dgm:styleLbl name="node1">
+    <dgm:scene3d>
+      <a:camera prst="orthographicFront"/>
+      <a:lightRig rig="threePt" dir="t"/>
+    </dgm:scene3d>
+    <dgm:sp3d/>
+    <dgm:txPr/>
+    <dgm:style>
+      <a:lnRef idx="2">
+        <a:scrgbClr r="0" g="0" b="0"/>
+      </a:lnRef>
+      <a:fillRef idx="1">
+        <a:scrgbClr r="0" g="0" b="0"/>
+      </a:fillRef>
+      <a:effectRef idx="0">
+        <a:scrgbClr r="0" g="0" b="0"/>
+      </a:effectRef>
+      <a:fontRef idx="minor">
+        <a:schemeClr val="lt1"/>
+      </a:fontRef>
+    </dgm:style>
+  </dgm:styleLbl>
+  <dgm:styleLbl name="node2">
+    <dgm:scene3d>
+      <a:camera prst="orthographicFront"/>
+      <a:lightRig rig="threePt" dir="t"/>
+    </dgm:scene3d>
+    <dgm:sp3d/>
+    <dgm:txPr/>
+    <dgm:style>
+      <a:lnRef idx="2">
+        <a:scrgbClr r="0" g="0" b="0"/>
+      </a:lnRef>
+      <a:fillRef idx="1">
+        <a:scrgbClr r="0" g="0" b="0"/>
+      </a:fillRef>
+      <a:effectRef idx="0">
+        <a:scrgbClr r="0" g="0" b="0"/>
+      </a:effectRef>
+      <a:fontRef idx="minor">
+        <a:schemeClr val="lt1"/>
+      </a:fontRef>
+    </dgm:style>
+  </dgm:styleLbl>
+  <dgm:styleLbl name="node3">
+    <dgm:scene3d>
+      <a:camera prst="orthographicFront"/>
+      <a:lightRig rig="threePt" dir="t"/>
+    </dgm:scene3d>
+    <dgm:sp3d/>
+    <dgm:txPr/>
+    <dgm:style>
+      <a:lnRef idx="2">
+        <a:scrgbClr r="0" g="0" b="0"/>
+      </a:lnRef>
+      <a:fillRef idx="1">
+        <a:scrgbClr r="0" g="0" b="0"/>
+      </a:fillRef>
+      <a:effectRef idx="0">
+        <a:scrgbClr r="0" g="0" b="0"/>
+      </a:effectRef>
+      <a:fontRef idx="minor">
+        <a:schemeClr val="lt1"/>
+      </a:fontRef>
+    </dgm:style>
+  </dgm:styleLbl>
+  <dgm:styleLbl name="node4">
+    <dgm:scene3d>
+      <a:camera prst="orthographicFront"/>
+      <a:lightRig rig="threePt" dir="t"/>
+    </dgm:scene3d>
+    <dgm:sp3d/>
+    <dgm:txPr/>
+    <dgm:style>
+      <a:lnRef idx="2">
+        <a:scrgbClr r="0" g="0" b="0"/>
+      </a:lnRef>
+      <a:fillRef idx="1">
+        <a:scrgbClr r="0" g="0" b="0"/>
+      </a:fillRef>
+      <a:effectRef idx="0">
+        <a:scrgbClr r="0" g="0" b="0"/>
+      </a:effectRef>
+      <a:fontRef idx="minor">
+        <a:schemeClr val="lt1"/>
+      </a:fontRef>
+    </dgm:style>
+  </dgm:styleLbl>
+  <dgm:styleLbl name="fgImgPlace1">
+    <dgm:scene3d>
+      <a:camera prst="orthographicFront"/>
+      <a:lightRig rig="threePt" dir="t"/>
+    </dgm:scene3d>
+    <dgm:sp3d/>
+    <dgm:txPr/>
+    <dgm:style>
+      <a:lnRef idx="2">
+        <a:scrgbClr r="0" g="0" b="0"/>
+      </a:lnRef>
+      <a:fillRef idx="1">
+        <a:scrgbClr r="0" g="0" b="0"/>
+      </a:fillRef>
+      <a:effectRef idx="0">
+        <a:scrgbClr r="0" g="0" b="0"/>
+      </a:effectRef>
+      <a:fontRef idx="minor"/>
+    </dgm:style>
+  </dgm:styleLbl>
+  <dgm:styleLbl name="alignImgPlace1">
+    <dgm:scene3d>
+      <a:camera prst="orthographicFront"/>
+      <a:lightRig rig="threePt" dir="t"/>
+    </dgm:scene3d>
+    <dgm:sp3d/>
+    <dgm:txPr/>
+    <dgm:style>
+      <a:lnRef idx="2">
+        <a:scrgbClr r="0" g="0" b="0"/>
+      </a:lnRef>
+      <a:fillRef idx="1">
+        <a:scrgbClr r="0" g="0" b="0"/>
+      </a:fillRef>
+      <a:effectRef idx="0">
+        <a:scrgbClr r="0" g="0" b="0"/>
+      </a:effectRef>
+      <a:fontRef idx="minor"/>
+    </dgm:style>
+  </dgm:styleLbl>
+  <dgm:styleLbl name="bgImgPlace1">
+    <dgm:scene3d>
+      <a:camera prst="orthographicFront"/>
+      <a:lightRig rig="threePt" dir="t"/>
+    </dgm:scene3d>
+    <dgm:sp3d/>
+    <dgm:txPr/>
+    <dgm:style>
+      <a:lnRef idx="2">
+        <a:scrgbClr r="0" g="0" b="0"/>
+      </a:lnRef>
+      <a:fillRef idx="1">
+        <a:scrgbClr r="0" g="0" b="0"/>
+      </a:fillRef>
+      <a:effectRef idx="0">
+        <a:scrgbClr r="0" g="0" b="0"/>
+      </a:effectRef>
+      <a:fontRef idx="minor"/>
+    </dgm:style>
+  </dgm:styleLbl>
+  <dgm:styleLbl name="sibTrans2D1">
+    <dgm:scene3d>
+      <a:camera prst="orthographicFront"/>
+      <a:lightRig rig="threePt" dir="t"/>
+    </dgm:scene3d>
+    <dgm:sp3d/>
+    <dgm:txPr/>
+    <dgm:style>
+      <a:lnRef idx="0">
+        <a:scrgbClr r="0" g="0" b="0"/>
+      </a:lnRef>
+      <a:fillRef idx="1">
+        <a:scrgbClr r="0" g="0" b="0"/>
+      </a:fillRef>
+      <a:effectRef idx="0">
+        <a:scrgbClr r="0" g="0" b="0"/>
+      </a:effectRef>
+      <a:fontRef idx="minor">
+        <a:schemeClr val="lt1"/>
+      </a:fontRef>
+    </dgm:style>
+  </dgm:styleLbl>
+  <dgm:styleLbl name="fgSibTrans2D1">
+    <dgm:scene3d>
+      <a:camera prst="orthographicFront"/>
+      <a:lightRig rig="threePt" dir="t"/>
+    </dgm:scene3d>
+    <dgm:sp3d/>
+    <dgm:txPr/>
+    <dgm:style>
+      <a:lnRef idx="0">
+        <a:scrgbClr r="0" g="0" b="0"/>
+      </a:lnRef>
+      <a:fillRef idx="1">
+        <a:scrgbClr r="0" g="0" b="0"/>
+      </a:fillRef>
+      <a:effectRef idx="0">
+        <a:scrgbClr r="0" g="0" b="0"/>
+      </a:effectRef>
+      <a:fontRef idx="minor">
+        <a:schemeClr val="lt1"/>
+      </a:fontRef>
+    </dgm:style>
+  </dgm:styleLbl>
+  <dgm:styleLbl name="bgSibTrans2D1">
+    <dgm:scene3d>
+      <a:camera prst="orthographicFront"/>
+      <a:lightRig rig="threePt" dir="t"/>
+    </dgm:scene3d>
+    <dgm:sp3d/>
+    <dgm:txPr/>
+    <dgm:style>
+      <a:lnRef idx="0">
+        <a:scrgbClr r="0" g="0" b="0"/>
+      </a:lnRef>
+      <a:fillRef idx="1">
+        <a:scrgbClr r="0" g="0" b="0"/>
+      </a:fillRef>
+      <a:effectRef idx="0">
+        <a:scrgbClr r="0" g="0" b="0"/>
+      </a:effectRef>
+      <a:fontRef idx="minor">
+        <a:schemeClr val="lt1"/>
+      </a:fontRef>
+    </dgm:style>
+  </dgm:styleLbl>
+  <dgm:styleLbl name="sibTrans1D1">
+    <dgm:scene3d>
+      <a:camera prst="orthographicFront"/>
+      <a:lightRig rig="threePt" dir="t"/>
+    </dgm:scene3d>
+    <dgm:sp3d/>
+    <dgm:txPr/>
+    <dgm:style>
+      <a:lnRef idx="1">
+        <a:scrgbClr r="0" g="0" b="0"/>
+      </a:lnRef>
+      <a:fillRef idx="0">
+        <a:scrgbClr r="0" g="0" b="0"/>
+      </a:fillRef>
+      <a:effectRef idx="0">
+        <a:scrgbClr r="0" g="0" b="0"/>
+      </a:effectRef>
+      <a:fontRef idx="minor"/>
+    </dgm:style>
+  </dgm:styleLbl>
+  <dgm:styleLbl name="callout">
+    <dgm:scene3d>
+      <a:camera prst="orthographicFront"/>
+      <a:lightRig rig="threePt" dir="t"/>
+    </dgm:scene3d>
+    <dgm:sp3d/>
+    <dgm:txPr/>
+    <dgm:style>
+      <a:lnRef idx="2">
+        <a:scrgbClr r="0" g="0" b="0"/>
+      </a:lnRef>
+      <a:fillRef idx="1">
+        <a:scrgbClr r="0" g="0" b="0"/>
+      </a:fillRef>
+      <a:effectRef idx="0">
+        <a:scrgbClr r="0" g="0" b="0"/>
+      </a:effectRef>
+      <a:fontRef idx="minor"/>
+    </dgm:style>
+  </dgm:styleLbl>
+  <dgm:styleLbl name="asst0">
+    <dgm:scene3d>
+      <a:camera prst="orthographicFront"/>
+      <a:lightRig rig="threePt" dir="t"/>
+    </dgm:scene3d>
+    <dgm:sp3d/>
+    <dgm:txPr/>
+    <dgm:style>
+      <a:lnRef idx="2">
+        <a:scrgbClr r="0" g="0" b="0"/>
+      </a:lnRef>
+      <a:fillRef idx="1">
+        <a:scrgbClr r="0" g="0" b="0"/>
+      </a:fillRef>
+      <a:effectRef idx="0">
+        <a:scrgbClr r="0" g="0" b="0"/>
+      </a:effectRef>
+      <a:fontRef idx="minor">
+        <a:schemeClr val="lt1"/>
+      </a:fontRef>
+    </dgm:style>
+  </dgm:styleLbl>
+  <dgm:styleLbl name="asst1">
+    <dgm:scene3d>
+      <a:camera prst="orthographicFront"/>
+      <a:lightRig rig="threePt" dir="t"/>
+    </dgm:scene3d>
+    <dgm:sp3d/>
+    <dgm:txPr/>
+    <dgm:style>
+      <a:lnRef idx="2">
+        <a:scrgbClr r="0" g="0" b="0"/>
+      </a:lnRef>
+      <a:fillRef idx="1">
+        <a:scrgbClr r="0" g="0" b="0"/>
+      </a:fillRef>
+      <a:effectRef idx="0">
+        <a:scrgbClr r="0" g="0" b="0"/>
+      </a:effectRef>
+      <a:fontRef idx="minor">
+        <a:schemeClr val="lt1"/>
+      </a:fontRef>
+    </dgm:style>
+  </dgm:styleLbl>
+  <dgm:styleLbl name="asst2">
+    <dgm:scene3d>
+      <a:camera prst="orthographicFront"/>
+      <a:lightRig rig="threePt" dir="t"/>
+    </dgm:scene3d>
+    <dgm:sp3d/>
+    <dgm:txPr/>
+    <dgm:style>
+      <a:lnRef idx="2">
+        <a:scrgbClr r="0" g="0" b="0"/>
+      </a:lnRef>
+      <a:fillRef idx="1">
+        <a:scrgbClr r="0" g="0" b="0"/>
+      </a:fillRef>
+      <a:effectRef idx="0">
+        <a:scrgbClr r="0" g="0" b="0"/>
+      </a:effectRef>
+      <a:fontRef idx="minor">
+        <a:schemeClr val="lt1"/>
+      </a:fontRef>
+    </dgm:style>
+  </dgm:styleLbl>
+  <dgm:styleLbl name="asst3">
+    <dgm:scene3d>
+      <a:camera prst="orthographicFront"/>
+      <a:lightRig rig="threePt" dir="t"/>
+    </dgm:scene3d>
+    <dgm:sp3d/>
+    <dgm:txPr/>
+    <dgm:style>
+      <a:lnRef idx="2">
+        <a:scrgbClr r="0" g="0" b="0"/>
+      </a:lnRef>
+      <a:fillRef idx="1">
+        <a:scrgbClr r="0" g="0" b="0"/>
+      </a:fillRef>
+      <a:effectRef idx="0">
+        <a:scrgbClr r="0" g="0" b="0"/>
+      </a:effectRef>
+      <a:fontRef idx="minor">
+        <a:schemeClr val="lt1"/>
+      </a:fontRef>
+    </dgm:style>
+  </dgm:styleLbl>
+  <dgm:styleLbl name="asst4">
+    <dgm:scene3d>
+      <a:camera prst="orthographicFront"/>
+      <a:lightRig rig="threePt" dir="t"/>
+    </dgm:scene3d>
+    <dgm:sp3d/>
+    <dgm:txPr/>
+    <dgm:style>
+      <a:lnRef idx="2">
+        <a:scrgbClr r="0" g="0" b="0"/>
+      </a:lnRef>
+      <a:fillRef idx="1">
+        <a:scrgbClr r="0" g="0" b="0"/>
+      </a:fillRef>
+      <a:effectRef idx="0">
+        <a:scrgbClr r="0" g="0" b="0"/>
+      </a:effectRef>
+      <a:fontRef idx="minor">
+        <a:schemeClr val="lt1"/>
+      </a:fontRef>
+    </dgm:style>
+  </dgm:styleLbl>
+  <dgm:styleLbl name="parChTrans2D1">
+    <dgm:scene3d>
+      <a:camera prst="orthographicFront"/>
+      <a:lightRig rig="threePt" dir="t"/>
+    </dgm:scene3d>
+    <dgm:sp3d/>
+    <dgm:txPr/>
+    <dgm:style>
+      <a:lnRef idx="2">
+        <a:scrgbClr r="0" g="0" b="0"/>
+      </a:lnRef>
+      <a:fillRef idx="1">
+        <a:scrgbClr r="0" g="0" b="0"/>
+      </a:fillRef>
+      <a:effectRef idx="0">
+        <a:scrgbClr r="0" g="0" b="0"/>
+      </a:effectRef>
+      <a:fontRef idx="minor">
+        <a:schemeClr val="lt1"/>
+      </a:fontRef>
+    </dgm:style>
+  </dgm:styleLbl>
+  <dgm:styleLbl name="parChTrans2D2">
+    <dgm:scene3d>
+      <a:camera prst="orthographicFront"/>
+      <a:lightRig rig="threePt" dir="t"/>
+    </dgm:scene3d>
+    <dgm:sp3d/>
+    <dgm:txPr/>
+    <dgm:style>
+      <a:lnRef idx="2">
+        <a:scrgbClr r="0" g="0" b="0"/>
+      </a:lnRef>
+      <a:fillRef idx="1">
+        <a:scrgbClr r="0" g="0" b="0"/>
+      </a:fillRef>
+      <a:effectRef idx="0">
+        <a:scrgbClr r="0" g="0" b="0"/>
+      </a:effectRef>
+      <a:fontRef idx="minor">
+        <a:schemeClr val="lt1"/>
+      </a:fontRef>
+    </dgm:style>
+  </dgm:styleLbl>
+  <dgm:styleLbl name="parChTrans2D3">
+    <dgm:scene3d>
+      <a:camera prst="orthographicFront"/>
+      <a:lightRig rig="threePt" dir="t"/>
+    </dgm:scene3d>
+    <dgm:sp3d/>
+    <dgm:txPr/>
+    <dgm:style>
+      <a:lnRef idx="2">
+        <a:scrgbClr r="0" g="0" b="0"/>
+      </a:lnRef>
+      <a:fillRef idx="1">
+        <a:scrgbClr r="0" g="0" b="0"/>
+      </a:fillRef>
+      <a:effectRef idx="0">
+        <a:scrgbClr r="0" g="0" b="0"/>
+      </a:effectRef>
+      <a:fontRef idx="minor">
+        <a:schemeClr val="lt1"/>
+      </a:fontRef>
+    </dgm:style>
+  </dgm:styleLbl>
+  <dgm:styleLbl name="parChTrans2D4">
+    <dgm:scene3d>
+      <a:camera prst="orthographicFront"/>
+      <a:lightRig rig="threePt" dir="t"/>
+    </dgm:scene3d>
+    <dgm:sp3d/>
+    <dgm:txPr/>
+    <dgm:style>
+      <a:lnRef idx="2">
+        <a:scrgbClr r="0" g="0" b="0"/>
+      </a:lnRef>
+      <a:fillRef idx="1">
+        <a:scrgbClr r="0" g="0" b="0"/>
+      </a:fillRef>
+      <a:effectRef idx="0">
+        <a:scrgbClr r="0" g="0" b="0"/>
+      </a:effectRef>
+      <a:fontRef idx="minor">
+        <a:schemeClr val="lt1"/>
+      </a:fontRef>
+    </dgm:style>
+  </dgm:styleLbl>
+  <dgm:styleLbl name="parChTrans1D1">
+    <dgm:scene3d>
+      <a:camera prst="orthographicFront"/>
+      <a:lightRig rig="threePt" dir="t"/>
+    </dgm:scene3d>
+    <dgm:sp3d/>
+    <dgm:txPr/>
+    <dgm:style>
+      <a:lnRef idx="2">
+        <a:scrgbClr r="0" g="0" b="0"/>
+      </a:lnRef>
+      <a:fillRef idx="0">
+        <a:scrgbClr r="0" g="0" b="0"/>
+      </a:fillRef>
+      <a:effectRef idx="0">
+        <a:scrgbClr r="0" g="0" b="0"/>
+      </a:effectRef>
+      <a:fontRef idx="minor"/>
+    </dgm:style>
+  </dgm:styleLbl>
+  <dgm:styleLbl name="parChTrans1D2">
+    <dgm:scene3d>
+      <a:camera prst="orthographicFront"/>
+      <a:lightRig rig="threePt" dir="t"/>
+    </dgm:scene3d>
+    <dgm:sp3d/>
+    <dgm:txPr/>
+    <dgm:style>
+      <a:lnRef idx="2">
+        <a:scrgbClr r="0" g="0" b="0"/>
+      </a:lnRef>
+      <a:fillRef idx="0">
+        <a:scrgbClr r="0" g="0" b="0"/>
+      </a:fillRef>
+      <a:effectRef idx="0">
+        <a:scrgbClr r="0" g="0" b="0"/>
+      </a:effectRef>
+      <a:fontRef idx="minor"/>
+    </dgm:style>
+  </dgm:styleLbl>
+  <dgm:styleLbl name="parChTrans1D3">
+    <dgm:scene3d>
+      <a:camera prst="orthographicFront"/>
+      <a:lightRig rig="threePt" dir="t"/>
+    </dgm:scene3d>
+    <dgm:sp3d/>
+    <dgm:txPr/>
+    <dgm:style>
+      <a:lnRef idx="2">
+        <a:scrgbClr r="0" g="0" b="0"/>
+      </a:lnRef>
+      <a:fillRef idx="0">
+        <a:scrgbClr r="0" g="0" b="0"/>
+      </a:fillRef>
+      <a:effectRef idx="0">
+        <a:scrgbClr r="0" g="0" b="0"/>
+      </a:effectRef>
+      <a:fontRef idx="minor"/>
+    </dgm:style>
+  </dgm:styleLbl>
+  <dgm:styleLbl name="parChTrans1D4">
+    <dgm:scene3d>
+      <a:camera prst="orthographicFront"/>
+      <a:lightRig rig="threePt" dir="t"/>
+    </dgm:scene3d>
+    <dgm:sp3d/>
+    <dgm:txPr/>
+    <dgm:style>
+      <a:lnRef idx="2">
+        <a:scrgbClr r="0" g="0" b="0"/>
+      </a:lnRef>
+      <a:fillRef idx="0">
+        <a:scrgbClr r="0" g="0" b="0"/>
+      </a:fillRef>
+      <a:effectRef idx="0">
+        <a:scrgbClr r="0" g="0" b="0"/>
+      </a:effectRef>
+      <a:fontRef idx="minor"/>
+    </dgm:style>
+  </dgm:styleLbl>
+  <dgm:styleLbl name="fgAcc1">
+    <dgm:scene3d>
+      <a:camera prst="orthographicFront"/>
+      <a:lightRig rig="threePt" dir="t"/>
+    </dgm:scene3d>
+    <dgm:sp3d/>
+    <dgm:txPr/>
+    <dgm:style>
+      <a:lnRef idx="2">
+        <a:scrgbClr r="0" g="0" b="0"/>
+      </a:lnRef>
+      <a:fillRef idx="1">
+        <a:scrgbClr r="0" g="0" b="0"/>
+      </a:fillRef>
+      <a:effectRef idx="0">
+        <a:scrgbClr r="0" g="0" b="0"/>
+      </a:effectRef>
+      <a:fontRef idx="minor"/>
+    </dgm:style>
+  </dgm:styleLbl>
+  <dgm:styleLbl name="conFgAcc1">
+    <dgm:scene3d>
+      <a:camera prst="orthographicFront"/>
+      <a:lightRig rig="threePt" dir="t"/>
+    </dgm:scene3d>
+    <dgm:sp3d/>
+    <dgm:txPr/>
+    <dgm:style>
+      <a:lnRef idx="2">
+        <a:scrgbClr r="0" g="0" b="0"/>
+      </a:lnRef>
+      <a:fillRef idx="1">
+        <a:scrgbClr r="0" g="0" b="0"/>
+      </a:fillRef>
+      <a:effectRef idx="0">
+        <a:scrgbClr r="0" g="0" b="0"/>
+      </a:effectRef>
+      <a:fontRef idx="minor"/>
+    </dgm:style>
+  </dgm:styleLbl>
+  <dgm:styleLbl name="alignAcc1">
+    <dgm:scene3d>
+      <a:camera prst="orthographicFront"/>
+      <a:lightRig rig="threePt" dir="t"/>
+    </dgm:scene3d>
+    <dgm:sp3d/>
+    <dgm:txPr/>
+    <dgm:style>
+      <a:lnRef idx="2">
+        <a:scrgbClr r="0" g="0" b="0"/>
+      </a:lnRef>
+      <a:fillRef idx="1">
+        <a:scrgbClr r="0" g="0" b="0"/>
+      </a:fillRef>
+      <a:effectRef idx="0">
+        <a:scrgbClr r="0" g="0" b="0"/>
+      </a:effectRef>
+      <a:fontRef idx="minor"/>
+    </dgm:style>
+  </dgm:styleLbl>
+  <dgm:styleLbl name="trAlignAcc1">
+    <dgm:scene3d>
+      <a:camera prst="orthographicFront"/>
+      <a:lightRig rig="threePt" dir="t"/>
+    </dgm:scene3d>
+    <dgm:sp3d/>
+    <dgm:txPr/>
+    <dgm:style>
+      <a:lnRef idx="1">
+        <a:scrgbClr r="0" g="0" b="0"/>
+      </a:lnRef>
+      <a:fillRef idx="1">
+        <a:scrgbClr r="0" g="0" b="0"/>
+      </a:fillRef>
+      <a:effectRef idx="0">
+        <a:scrgbClr r="0" g="0" b="0"/>
+      </a:effectRef>
+      <a:fontRef idx="minor"/>
+    </dgm:style>
+  </dgm:styleLbl>
+  <dgm:styleLbl name="bgAcc1">
+    <dgm:scene3d>
+      <a:camera prst="orthographicFront"/>
+      <a:lightRig rig="threePt" dir="t"/>
+    </dgm:scene3d>
+    <dgm:sp3d/>
+    <dgm:txPr/>
+    <dgm:style>
+      <a:lnRef idx="2">
+        <a:scrgbClr r="0" g="0" b="0"/>
+      </a:lnRef>
+      <a:fillRef idx="1">
+        <a:scrgbClr r="0" g="0" b="0"/>
+      </a:fillRef>
+      <a:effectRef idx="0">
+        <a:scrgbClr r="0" g="0" b="0"/>
+      </a:effectRef>
+      <a:fontRef idx="minor"/>
+    </dgm:style>
+  </dgm:styleLbl>
+  <dgm:styleLbl name="solidFgAcc1">
+    <dgm:scene3d>
+      <a:camera prst="orthographicFront"/>
+      <a:lightRig rig="threePt" dir="t"/>
+    </dgm:scene3d>
+    <dgm:sp3d/>
+    <dgm:txPr/>
+    <dgm:style>
+      <a:lnRef idx="2">
+        <a:scrgbClr r="0" g="0" b="0"/>
+      </a:lnRef>
+      <a:fillRef idx="1">
+        <a:scrgbClr r="0" g="0" b="0"/>
+      </a:fillRef>
+      <a:effectRef idx="0">
+        <a:scrgbClr r="0" g="0" b="0"/>
+      </a:effectRef>
+      <a:fontRef idx="minor"/>
+    </dgm:style>
+  </dgm:styleLbl>
+  <dgm:styleLbl name="solidAlignAcc1">
+    <dgm:scene3d>
+      <a:camera prst="orthographicFront"/>
+      <a:lightRig rig="threePt" dir="t"/>
+    </dgm:scene3d>
+    <dgm:sp3d/>
+    <dgm:txPr/>
+    <dgm:style>
+      <a:lnRef idx="2">
+        <a:scrgbClr r="0" g="0" b="0"/>
+      </a:lnRef>
+      <a:fillRef idx="1">
+        <a:scrgbClr r="0" g="0" b="0"/>
+      </a:fillRef>
+      <a:effectRef idx="0">
+        <a:scrgbClr r="0" g="0" b="0"/>
+      </a:effectRef>
+      <a:fontRef idx="minor"/>
+    </dgm:style>
+  </dgm:styleLbl>
+  <dgm:styleLbl name="solidBgAcc1">
+    <dgm:scene3d>
+      <a:camera prst="orthographicFront"/>
+      <a:lightRig rig="threePt" dir="t"/>
+    </dgm:scene3d>
+    <dgm:sp3d/>
+    <dgm:txPr/>
+    <dgm:style>
+      <a:lnRef idx="2">
+        <a:scrgbClr r="0" g="0" b="0"/>
+      </a:lnRef>
+      <a:fillRef idx="1">
+        <a:scrgbClr r="0" g="0" b="0"/>
+      </a:fillRef>
+      <a:effectRef idx="0">
+        <a:scrgbClr r="0" g="0" b="0"/>
+      </a:effectRef>
+      <a:fontRef idx="minor"/>
+    </dgm:style>
+  </dgm:styleLbl>
+  <dgm:styleLbl name="fgAccFollowNode1">
+    <dgm:scene3d>
+      <a:camera prst="orthographicFront"/>
+      <a:lightRig rig="threePt" dir="t"/>
+    </dgm:scene3d>
+    <dgm:sp3d/>
+    <dgm:txPr/>
+    <dgm:style>
+      <a:lnRef idx="2">
+        <a:scrgbClr r="0" g="0" b="0"/>
+      </a:lnRef>
+      <a:fillRef idx="1">
+        <a:scrgbClr r="0" g="0" b="0"/>
+      </a:fillRef>
+      <a:effectRef idx="0">
+        <a:scrgbClr r="0" g="0" b="0"/>
+      </a:effectRef>
+      <a:fontRef idx="minor"/>
+    </dgm:style>
+  </dgm:styleLbl>
+  <dgm:styleLbl name="alignAccFollowNode1">
+    <dgm:scene3d>
+      <a:camera prst="orthographicFront"/>
+      <a:lightRig rig="threePt" dir="t"/>
+    </dgm:scene3d>
+    <dgm:sp3d/>
+    <dgm:txPr/>
+    <dgm:style>
+      <a:lnRef idx="2">
+        <a:scrgbClr r="0" g="0" b="0"/>
+      </a:lnRef>
+      <a:fillRef idx="1">
+        <a:scrgbClr r="0" g="0" b="0"/>
+      </a:fillRef>
+      <a:effectRef idx="0">
+        <a:scrgbClr r="0" g="0" b="0"/>
+      </a:effectRef>
+      <a:fontRef idx="minor"/>
+    </dgm:style>
+  </dgm:styleLbl>
+  <dgm:styleLbl name="bgAccFollowNode1">
+    <dgm:scene3d>
+      <a:camera prst="orthographicFront"/>
+      <a:lightRig rig="threePt" dir="t"/>
+    </dgm:scene3d>
+    <dgm:sp3d/>
+    <dgm:txPr/>
+    <dgm:style>
+      <a:lnRef idx="2">
+        <a:scrgbClr r="0" g="0" b="0"/>
+      </a:lnRef>
+      <a:fillRef idx="1">
+        <a:scrgbClr r="0" g="0" b="0"/>
+      </a:fillRef>
+      <a:effectRef idx="0">
+        <a:scrgbClr r="0" g="0" b="0"/>
+      </a:effectRef>
+      <a:fontRef idx="minor"/>
+    </dgm:style>
+  </dgm:styleLbl>
+  <dgm:styleLbl name="fgAcc0">
+    <dgm:scene3d>
+      <a:camera prst="orthographicFront"/>
+      <a:lightRig rig="threePt" dir="t"/>
+    </dgm:scene3d>
+    <dgm:sp3d/>
+    <dgm:txPr/>
+    <dgm:style>
+      <a:lnRef idx="2">
+        <a:scrgbClr r="0" g="0" b="0"/>
+      </a:lnRef>
+      <a:fillRef idx="1">
+        <a:scrgbClr r="0" g="0" b="0"/>
+      </a:fillRef>
+      <a:effectRef idx="0">
+        <a:scrgbClr r="0" g="0" b="0"/>
+      </a:effectRef>
+      <a:fontRef idx="minor"/>
+    </dgm:style>
+  </dgm:styleLbl>
+  <dgm:styleLbl name="fgAcc2">
+    <dgm:scene3d>
+      <a:camera prst="orthographicFront"/>
+      <a:lightRig rig="threePt" dir="t"/>
+    </dgm:scene3d>
+    <dgm:sp3d/>
+    <dgm:txPr/>
+    <dgm:style>
+      <a:lnRef idx="2">
+        <a:scrgbClr r="0" g="0" b="0"/>
+      </a:lnRef>
+      <a:fillRef idx="1">
+        <a:scrgbClr r="0" g="0" b="0"/>
+      </a:fillRef>
+      <a:effectRef idx="0">
+        <a:scrgbClr r="0" g="0" b="0"/>
+      </a:effectRef>
+      <a:fontRef idx="minor"/>
+    </dgm:style>
+  </dgm:styleLbl>
+  <dgm:styleLbl name="fgAcc3">
+    <dgm:scene3d>
+      <a:camera prst="orthographicFront"/>
+      <a:lightRig rig="threePt" dir="t"/>
+    </dgm:scene3d>
+    <dgm:sp3d/>
+    <dgm:txPr/>
+    <dgm:style>
+      <a:lnRef idx="2">
+        <a:scrgbClr r="0" g="0" b="0"/>
+      </a:lnRef>
+      <a:fillRef idx="1">
+        <a:scrgbClr r="0" g="0" b="0"/>
+      </a:fillRef>
+      <a:effectRef idx="0">
+        <a:scrgbClr r="0" g="0" b="0"/>
+      </a:effectRef>
+      <a:fontRef idx="minor"/>
+    </dgm:style>
+  </dgm:styleLbl>
+  <dgm:styleLbl name="fgAcc4">
+    <dgm:scene3d>
+      <a:camera prst="orthographicFront"/>
+      <a:lightRig rig="threePt" dir="t"/>
+    </dgm:scene3d>
+    <dgm:sp3d/>
+    <dgm:txPr/>
+    <dgm:style>
+      <a:lnRef idx="2">
+        <a:scrgbClr r="0" g="0" b="0"/>
+      </a:lnRef>
+      <a:fillRef idx="1">
+        <a:scrgbClr r="0" g="0" b="0"/>
+      </a:fillRef>
+      <a:effectRef idx="0">
+        <a:scrgbClr r="0" g="0" b="0"/>
+      </a:effectRef>
+      <a:fontRef idx="minor"/>
+    </dgm:style>
+  </dgm:styleLbl>
+  <dgm:styleLbl name="bgShp">
+    <dgm:scene3d>
+      <a:camera prst="orthographicFront"/>
+      <a:lightRig rig="threePt" dir="t"/>
+    </dgm:scene3d>
+    <dgm:sp3d/>
+    <dgm:txPr/>
+    <dgm:style>
+      <a:lnRef idx="0">
+        <a:scrgbClr r="0" g="0" b="0"/>
+      </a:lnRef>
+      <a:fillRef idx="1">
+        <a:scrgbClr r="0" g="0" b="0"/>
+      </a:fillRef>
+      <a:effectRef idx="0">
+        <a:scrgbClr r="0" g="0" b="0"/>
+      </a:effectRef>
+      <a:fontRef idx="minor"/>
+    </dgm:style>
+  </dgm:styleLbl>
+  <dgm:styleLbl name="dkBgShp">
+    <dgm:scene3d>
+      <a:camera prst="orthographicFront"/>
+      <a:lightRig rig="threePt" dir="t"/>
+    </dgm:scene3d>
+    <dgm:sp3d/>
+    <dgm:txPr/>
+    <dgm:style>
+      <a:lnRef idx="0">
+        <a:scrgbClr r="0" g="0" b="0"/>
+      </a:lnRef>
+      <a:fillRef idx="1">
+        <a:scrgbClr r="0" g="0" b="0"/>
+      </a:fillRef>
+      <a:effectRef idx="0">
+        <a:scrgbClr r="0" g="0" b="0"/>
+      </a:effectRef>
+      <a:fontRef idx="minor"/>
+    </dgm:style>
+  </dgm:styleLbl>
+  <dgm:styleLbl name="trBgShp">
+    <dgm:scene3d>
+      <a:camera prst="orthographicFront"/>
+      <a:lightRig rig="threePt" dir="t"/>
+    </dgm:scene3d>
+    <dgm:sp3d/>
+    <dgm:txPr/>
+    <dgm:style>
+      <a:lnRef idx="0">
+        <a:scrgbClr r="0" g="0" b="0"/>
+      </a:lnRef>
+      <a:fillRef idx="1">
+        <a:scrgbClr r="0" g="0" b="0"/>
+      </a:fillRef>
+      <a:effectRef idx="0">
+        <a:scrgbClr r="0" g="0" b="0"/>
+      </a:effectRef>
+      <a:fontRef idx="minor"/>
+    </dgm:style>
+  </dgm:styleLbl>
+  <dgm:styleLbl name="fgShp">
+    <dgm:scene3d>
+      <a:camera prst="orthographicFront"/>
+      <a:lightRig rig="threePt" dir="t"/>
+    </dgm:scene3d>
+    <dgm:sp3d/>
+    <dgm:txPr/>
+    <dgm:style>
+      <a:lnRef idx="2">
+        <a:scrgbClr r="0" g="0" b="0"/>
+      </a:lnRef>
+      <a:fillRef idx="1">
+        <a:scrgbClr r="0" g="0" b="0"/>
+      </a:fillRef>
+      <a:effectRef idx="0">
+        <a:scrgbClr r="0" g="0" b="0"/>
+      </a:effectRef>
+      <a:fontRef idx="minor"/>
+    </dgm:style>
+  </dgm:styleLbl>
+  <dgm:styleLbl name="revTx">
+    <dgm:scene3d>
+      <a:camera prst="orthographicFront"/>
+      <a:lightRig rig="threePt" dir="t"/>
+    </dgm:scene3d>
+    <dgm:sp3d/>
+    <dgm:txPr/>
+    <dgm:style>
+      <a:lnRef idx="0">
+        <a:scrgbClr r="0" g="0" b="0"/>
+      </a:lnRef>
+      <a:fillRef idx="0">
+        <a:scrgbClr r="0" g="0" b="0"/>
+      </a:fillRef>
+      <a:effectRef idx="0">
+        <a:scrgbClr r="0" g="0" b="0"/>
+      </a:effectRef>
+      <a:fontRef idx="minor"/>
+    </dgm:style>
+  </dgm:styleLbl>
+</dgm:styleDef>
+</file>
+
 <file path=ppt/diagrams/quickStyle2.xml><?xml version="1.0" encoding="utf-8"?>
 <dgm:styleDef xmlns:dgm="http://schemas.openxmlformats.org/drawingml/2006/diagram" xmlns:a="http://schemas.openxmlformats.org/drawingml/2006/main" uniqueId="urn:microsoft.com/office/officeart/2005/8/quickstyle/simple1">
   <dgm:title val=""/>
@@ -9771,7 +11810,7 @@
           <a:p>
             <a:fld id="{D221393F-C92B-4776-837E-E513EDD2BA88}" type="datetimeFigureOut">
               <a:rPr lang="en-US" smtClean="0"/>
-              <a:t>01/19/2023</a:t>
+              <a:t>02/26/2023</a:t>
             </a:fld>
             <a:endParaRPr lang="en-US"/>
           </a:p>
@@ -10234,7 +12273,7 @@
           <a:p>
             <a:fld id="{6D196EBA-8A47-4EA5-A4BB-96AD741AB753}" type="datetimeFigureOut">
               <a:rPr lang="en-US" smtClean="0"/>
-              <a:t>01/19/2023</a:t>
+              <a:t>02/26/2023</a:t>
             </a:fld>
             <a:endParaRPr lang="en-US"/>
           </a:p>
@@ -10515,7 +12554,7 @@
           <a:p>
             <a:fld id="{6D196EBA-8A47-4EA5-A4BB-96AD741AB753}" type="datetimeFigureOut">
               <a:rPr lang="en-US" smtClean="0"/>
-              <a:t>01/19/2023</a:t>
+              <a:t>02/26/2023</a:t>
             </a:fld>
             <a:endParaRPr lang="en-US"/>
           </a:p>
@@ -10707,7 +12746,7 @@
           <a:p>
             <a:fld id="{6D196EBA-8A47-4EA5-A4BB-96AD741AB753}" type="datetimeFigureOut">
               <a:rPr lang="en-US" smtClean="0"/>
-              <a:t>01/19/2023</a:t>
+              <a:t>02/26/2023</a:t>
             </a:fld>
             <a:endParaRPr lang="en-US"/>
           </a:p>
@@ -10968,7 +13007,7 @@
           <a:p>
             <a:fld id="{6D196EBA-8A47-4EA5-A4BB-96AD741AB753}" type="datetimeFigureOut">
               <a:rPr lang="en-US" smtClean="0"/>
-              <a:t>01/19/2023</a:t>
+              <a:t>02/26/2023</a:t>
             </a:fld>
             <a:endParaRPr lang="en-US"/>
           </a:p>
@@ -11394,7 +13433,7 @@
           <a:p>
             <a:fld id="{6D196EBA-8A47-4EA5-A4BB-96AD741AB753}" type="datetimeFigureOut">
               <a:rPr lang="en-US" smtClean="0"/>
-              <a:t>01/19/2023</a:t>
+              <a:t>02/26/2023</a:t>
             </a:fld>
             <a:endParaRPr lang="en-US"/>
           </a:p>
@@ -11940,7 +13979,7 @@
           <a:p>
             <a:fld id="{6D196EBA-8A47-4EA5-A4BB-96AD741AB753}" type="datetimeFigureOut">
               <a:rPr lang="en-US" smtClean="0"/>
-              <a:t>01/19/2023</a:t>
+              <a:t>02/26/2023</a:t>
             </a:fld>
             <a:endParaRPr lang="en-US"/>
           </a:p>
@@ -12771,7 +14810,7 @@
           <a:p>
             <a:fld id="{6D196EBA-8A47-4EA5-A4BB-96AD741AB753}" type="datetimeFigureOut">
               <a:rPr lang="en-US" smtClean="0"/>
-              <a:t>01/19/2023</a:t>
+              <a:t>02/26/2023</a:t>
             </a:fld>
             <a:endParaRPr lang="en-US"/>
           </a:p>
@@ -12941,7 +14980,7 @@
           <a:p>
             <a:fld id="{6D196EBA-8A47-4EA5-A4BB-96AD741AB753}" type="datetimeFigureOut">
               <a:rPr lang="en-US" smtClean="0"/>
-              <a:t>01/19/2023</a:t>
+              <a:t>02/26/2023</a:t>
             </a:fld>
             <a:endParaRPr lang="en-US"/>
           </a:p>
@@ -13121,7 +15160,7 @@
           <a:p>
             <a:fld id="{6D196EBA-8A47-4EA5-A4BB-96AD741AB753}" type="datetimeFigureOut">
               <a:rPr lang="en-US" smtClean="0"/>
-              <a:t>01/19/2023</a:t>
+              <a:t>02/26/2023</a:t>
             </a:fld>
             <a:endParaRPr lang="en-US"/>
           </a:p>
@@ -13291,7 +15330,7 @@
           <a:p>
             <a:fld id="{6D196EBA-8A47-4EA5-A4BB-96AD741AB753}" type="datetimeFigureOut">
               <a:rPr lang="en-US" smtClean="0"/>
-              <a:t>01/19/2023</a:t>
+              <a:t>02/26/2023</a:t>
             </a:fld>
             <a:endParaRPr lang="en-US"/>
           </a:p>
@@ -13548,7 +15587,7 @@
           <a:p>
             <a:fld id="{6D196EBA-8A47-4EA5-A4BB-96AD741AB753}" type="datetimeFigureOut">
               <a:rPr lang="en-US" smtClean="0"/>
-              <a:t>01/19/2023</a:t>
+              <a:t>02/26/2023</a:t>
             </a:fld>
             <a:endParaRPr lang="en-US"/>
           </a:p>
@@ -13780,7 +15819,7 @@
           <a:p>
             <a:fld id="{6D196EBA-8A47-4EA5-A4BB-96AD741AB753}" type="datetimeFigureOut">
               <a:rPr lang="en-US" smtClean="0"/>
-              <a:t>01/19/2023</a:t>
+              <a:t>02/26/2023</a:t>
             </a:fld>
             <a:endParaRPr lang="en-US"/>
           </a:p>
@@ -14173,7 +16212,7 @@
           <a:p>
             <a:fld id="{6D196EBA-8A47-4EA5-A4BB-96AD741AB753}" type="datetimeFigureOut">
               <a:rPr lang="en-US" smtClean="0"/>
-              <a:t>01/19/2023</a:t>
+              <a:t>02/26/2023</a:t>
             </a:fld>
             <a:endParaRPr lang="en-US"/>
           </a:p>
@@ -14291,7 +16330,7 @@
           <a:p>
             <a:fld id="{6D196EBA-8A47-4EA5-A4BB-96AD741AB753}" type="datetimeFigureOut">
               <a:rPr lang="en-US" smtClean="0"/>
-              <a:t>01/19/2023</a:t>
+              <a:t>02/26/2023</a:t>
             </a:fld>
             <a:endParaRPr lang="en-US"/>
           </a:p>
@@ -14386,7 +16425,7 @@
           <a:p>
             <a:fld id="{6D196EBA-8A47-4EA5-A4BB-96AD741AB753}" type="datetimeFigureOut">
               <a:rPr lang="en-US" smtClean="0"/>
-              <a:t>01/19/2023</a:t>
+              <a:t>02/26/2023</a:t>
             </a:fld>
             <a:endParaRPr lang="en-US"/>
           </a:p>
@@ -14659,7 +16698,7 @@
           <a:p>
             <a:fld id="{6D196EBA-8A47-4EA5-A4BB-96AD741AB753}" type="datetimeFigureOut">
               <a:rPr lang="en-US" smtClean="0"/>
-              <a:t>01/19/2023</a:t>
+              <a:t>02/26/2023</a:t>
             </a:fld>
             <a:endParaRPr lang="en-US"/>
           </a:p>
@@ -14940,7 +16979,7 @@
           <a:p>
             <a:fld id="{6D196EBA-8A47-4EA5-A4BB-96AD741AB753}" type="datetimeFigureOut">
               <a:rPr lang="en-US" smtClean="0"/>
-              <a:t>01/19/2023</a:t>
+              <a:t>02/26/2023</a:t>
             </a:fld>
             <a:endParaRPr lang="en-US"/>
           </a:p>
@@ -15180,7 +17219,7 @@
           <a:p>
             <a:fld id="{6D196EBA-8A47-4EA5-A4BB-96AD741AB753}" type="datetimeFigureOut">
               <a:rPr lang="en-US" smtClean="0"/>
-              <a:t>01/19/2023</a:t>
+              <a:t>02/26/2023</a:t>
             </a:fld>
             <a:endParaRPr lang="en-US"/>
           </a:p>
@@ -17957,8 +19996,8 @@
           </a:p>
         </p:txBody>
       </p:sp>
-      <mc:AlternateContent xmlns:mc="http://schemas.openxmlformats.org/markup-compatibility/2006">
-        <mc:Choice xmlns:a14="http://schemas.microsoft.com/office/drawing/2010/main" Requires="a14">
+      <mc:AlternateContent xmlns:mc="http://schemas.openxmlformats.org/markup-compatibility/2006" xmlns:a14="http://schemas.microsoft.com/office/drawing/2010/main">
+        <mc:Choice Requires="a14">
           <p:sp>
             <p:nvSpPr>
               <p:cNvPr id="3" name="Content Placeholder 2">
@@ -18271,7 +20310,7 @@
                           <m:sSub>
                             <m:sSubPr>
                               <m:ctrlPr>
-                                <a:rPr lang="en-US" sz="2000" b="1" i="0" smtClean="0">
+                                <a:rPr lang="en-US" sz="2000" b="1" i="1" smtClean="0">
                                   <a:gradFill>
                                     <a:gsLst>
                                       <a:gs pos="34000">
@@ -18381,7 +20420,7 @@
             </p:txBody>
           </p:sp>
         </mc:Choice>
-        <mc:Fallback>
+        <mc:Fallback xmlns="">
           <p:sp>
             <p:nvSpPr>
               <p:cNvPr id="3" name="Content Placeholder 2">
@@ -18640,8 +20679,8 @@
           </a:p>
         </p:txBody>
       </p:sp>
-      <mc:AlternateContent xmlns:mc="http://schemas.openxmlformats.org/markup-compatibility/2006">
-        <mc:Choice xmlns:a14="http://schemas.microsoft.com/office/drawing/2010/main" Requires="a14">
+      <mc:AlternateContent xmlns:mc="http://schemas.openxmlformats.org/markup-compatibility/2006" xmlns:a14="http://schemas.microsoft.com/office/drawing/2010/main">
+        <mc:Choice Requires="a14">
           <p:sp>
             <p:nvSpPr>
               <p:cNvPr id="5" name="Content Placeholder 4">
@@ -18787,7 +20826,7 @@
             </p:txBody>
           </p:sp>
         </mc:Choice>
-        <mc:Fallback>
+        <mc:Fallback xmlns="">
           <p:sp>
             <p:nvSpPr>
               <p:cNvPr id="5" name="Content Placeholder 4">
@@ -19278,8 +21317,8 @@
           </a:p>
         </p:txBody>
       </p:sp>
-      <mc:AlternateContent xmlns:mc="http://schemas.openxmlformats.org/markup-compatibility/2006">
-        <mc:Choice xmlns:a14="http://schemas.microsoft.com/office/drawing/2010/main" Requires="a14">
+      <mc:AlternateContent xmlns:mc="http://schemas.openxmlformats.org/markup-compatibility/2006" xmlns:a14="http://schemas.microsoft.com/office/drawing/2010/main">
+        <mc:Choice Requires="a14">
           <p:graphicFrame>
             <p:nvGraphicFramePr>
               <p:cNvPr id="4" name="Content Placeholder 3">
@@ -19312,7 +21351,7 @@
             </a:graphic>
           </p:graphicFrame>
         </mc:Choice>
-        <mc:Fallback>
+        <mc:Fallback xmlns="">
           <p:graphicFrame>
             <p:nvGraphicFramePr>
               <p:cNvPr id="4" name="Content Placeholder 3">
@@ -19340,7 +21379,7 @@
             </p:xfrm>
             <a:graphic>
               <a:graphicData uri="http://schemas.openxmlformats.org/drawingml/2006/diagram">
-                <dgm:relIds xmlns:dgm="http://schemas.openxmlformats.org/drawingml/2006/diagram" xmlns:r="http://schemas.openxmlformats.org/officeDocument/2006/relationships" r:dm="rId7" r:lo="rId3" r:qs="rId4" r:cs="rId5"/>
+                <dgm:relIds xmlns:dgm="http://schemas.openxmlformats.org/drawingml/2006/diagram" xmlns:r="http://schemas.openxmlformats.org/officeDocument/2006/relationships" r:dm="rId7" r:lo="rId8" r:qs="rId9" r:cs="rId10"/>
               </a:graphicData>
             </a:graphic>
           </p:graphicFrame>
@@ -19718,7 +21757,7 @@
               <p:nvPr>
                 <p:extLst>
                   <p:ext uri="{D42A27DB-BD31-4B8C-83A1-F6EECF244321}">
-                    <p14:modId xmlns:p14="http://schemas.microsoft.com/office/powerpoint/2010/main" val="3994558772"/>
+                    <p14:modId xmlns:p14="http://schemas.microsoft.com/office/powerpoint/2010/main" val="3641669922"/>
                   </p:ext>
                 </p:extLst>
               </p:nvPr>
@@ -19760,6 +21799,11 @@
                             <a:alpha val="30196"/>
                           </a:srgbClr>
                         </a:solidFill>
+                        <a:ln w="3175">
+                          <a:solidFill>
+                            <a:prstClr val="ltGray"/>
+                          </a:solidFill>
+                        </a:ln>
                       </p166:spPr>
                     </pslz:zmPr>
                   </pslz:sldZmObj>
@@ -19811,6 +21855,11 @@
                   <a:alpha val="30196"/>
                 </a:srgbClr>
               </a:solidFill>
+              <a:ln w="3175">
+                <a:solidFill>
+                  <a:prstClr val="ltGray"/>
+                </a:solidFill>
+              </a:ln>
             </p:spPr>
           </p:pic>
         </mc:Fallback>
@@ -20460,15 +22509,6 @@
 </file>
 
 <file path=customXml/item1.xml><?xml version="1.0" encoding="utf-8"?>
-<?mso-contentType ?>
-<FormTemplates xmlns="http://schemas.microsoft.com/sharepoint/v3/contenttype/forms">
-  <Display>DocumentLibraryForm</Display>
-  <Edit>DocumentLibraryForm</Edit>
-  <New>DocumentLibraryForm</New>
-</FormTemplates>
-</file>
-
-<file path=customXml/item2.xml><?xml version="1.0" encoding="utf-8"?>
 <ct:contentTypeSchema xmlns:ct="http://schemas.microsoft.com/office/2006/metadata/contentType" xmlns:ma="http://schemas.microsoft.com/office/2006/metadata/properties/metaAttributes" ct:_="" ma:_="" ma:contentTypeName="Document" ma:contentTypeID="0x0101002DBDC53E9E417B429B2DC364D97CEA58" ma:contentTypeVersion="16" ma:contentTypeDescription="Create a new document." ma:contentTypeScope="" ma:versionID="de87c321b40b1ac42ff180f0d137d3cf">
   <xsd:schema xmlns:xsd="http://www.w3.org/2001/XMLSchema" xmlns:xs="http://www.w3.org/2001/XMLSchema" xmlns:p="http://schemas.microsoft.com/office/2006/metadata/properties" xmlns:ns3="50aad3ac-2d76-44e0-be38-8061e626423d" xmlns:ns4="35264c6f-537a-4128-9565-85508ff1f0ac" targetNamespace="http://schemas.microsoft.com/office/2006/metadata/properties" ma:root="true" ma:fieldsID="f1b33befb8e5401b783ec0d259109d93" ns3:_="" ns4:_="">
     <xsd:import namespace="50aad3ac-2d76-44e0-be38-8061e626423d"/>
@@ -20709,6 +22749,15 @@
 </ct:contentTypeSchema>
 </file>
 
+<file path=customXml/item2.xml><?xml version="1.0" encoding="utf-8"?>
+<?mso-contentType ?>
+<FormTemplates xmlns="http://schemas.microsoft.com/sharepoint/v3/contenttype/forms">
+  <Display>DocumentLibraryForm</Display>
+  <Edit>DocumentLibraryForm</Edit>
+  <New>DocumentLibraryForm</New>
+</FormTemplates>
+</file>
+
 <file path=customXml/item3.xml><?xml version="1.0" encoding="utf-8"?>
 <p:properties xmlns:p="http://schemas.microsoft.com/office/2006/metadata/properties" xmlns:xsi="http://www.w3.org/2001/XMLSchema-instance" xmlns:pc="http://schemas.microsoft.com/office/infopath/2007/PartnerControls">
   <documentManagement>
@@ -20718,14 +22767,6 @@
 </file>
 
 <file path=customXml/itemProps1.xml><?xml version="1.0" encoding="utf-8"?>
-<ds:datastoreItem xmlns:ds="http://schemas.openxmlformats.org/officeDocument/2006/customXml" ds:itemID="{040779E5-C8E8-4AD3-BC87-0AE21F5EB19B}">
-  <ds:schemaRefs>
-    <ds:schemaRef ds:uri="http://schemas.microsoft.com/sharepoint/v3/contenttype/forms"/>
-  </ds:schemaRefs>
-</ds:datastoreItem>
-</file>
-
-<file path=customXml/itemProps2.xml><?xml version="1.0" encoding="utf-8"?>
 <ds:datastoreItem xmlns:ds="http://schemas.openxmlformats.org/officeDocument/2006/customXml" ds:itemID="{BC09C005-EA28-4DE2-A605-87CB14712A46}">
   <ds:schemaRefs>
     <ds:schemaRef ds:uri="http://schemas.microsoft.com/office/2006/metadata/contentType"/>
@@ -20744,6 +22785,14 @@
 </ds:datastoreItem>
 </file>
 
+<file path=customXml/itemProps2.xml><?xml version="1.0" encoding="utf-8"?>
+<ds:datastoreItem xmlns:ds="http://schemas.openxmlformats.org/officeDocument/2006/customXml" ds:itemID="{040779E5-C8E8-4AD3-BC87-0AE21F5EB19B}">
+  <ds:schemaRefs>
+    <ds:schemaRef ds:uri="http://schemas.microsoft.com/sharepoint/v3/contenttype/forms"/>
+  </ds:schemaRefs>
+</ds:datastoreItem>
+</file>
+
 <file path=customXml/itemProps3.xml><?xml version="1.0" encoding="utf-8"?>
 <ds:datastoreItem xmlns:ds="http://schemas.openxmlformats.org/officeDocument/2006/customXml" ds:itemID="{66962D79-14D2-4BFC-9319-C97288072665}">
   <ds:schemaRefs>

</xml_diff>